<commit_message>
Most done. Leave metric as last work.
</commit_message>
<xml_diff>
--- a/4_SDNE/SDNEppt.pptx
+++ b/4_SDNE/SDNEppt.pptx
@@ -4,10 +4,20 @@
   <p:sldMasterIdLst>
     <p:sldMasterId id="2147483648" r:id="rId1"/>
   </p:sldMasterIdLst>
+  <p:notesMasterIdLst>
+    <p:notesMasterId r:id="rId12"/>
+  </p:notesMasterIdLst>
   <p:sldIdLst>
     <p:sldId id="256" r:id="rId2"/>
     <p:sldId id="257" r:id="rId3"/>
     <p:sldId id="258" r:id="rId4"/>
+    <p:sldId id="260" r:id="rId5"/>
+    <p:sldId id="259" r:id="rId6"/>
+    <p:sldId id="264" r:id="rId7"/>
+    <p:sldId id="266" r:id="rId8"/>
+    <p:sldId id="265" r:id="rId9"/>
+    <p:sldId id="263" r:id="rId10"/>
+    <p:sldId id="261" r:id="rId11"/>
   </p:sldIdLst>
   <p:sldSz cx="12192000" cy="6858000"/>
   <p:notesSz cx="6858000" cy="9144000"/>
@@ -106,7 +116,784 @@
       </a:defRPr>
     </a:lvl9pPr>
   </p:defaultTextStyle>
+  <p:extLst>
+    <p:ext uri="{EFAFB233-063F-42B5-8137-9DF3F51BA10A}">
+      <p15:sldGuideLst xmlns:p15="http://schemas.microsoft.com/office/powerpoint/2012/main"/>
+    </p:ext>
+  </p:extLst>
 </p:presentation>
+</file>
+
+<file path=ppt/notesMasters/notesMaster1.xml><?xml version="1.0" encoding="utf-8"?>
+<p:notesMaster xmlns:a="http://schemas.openxmlformats.org/drawingml/2006/main" xmlns:r="http://schemas.openxmlformats.org/officeDocument/2006/relationships" xmlns:p="http://schemas.openxmlformats.org/presentationml/2006/main">
+  <p:cSld>
+    <p:bg>
+      <p:bgRef idx="1001">
+        <a:schemeClr val="bg1"/>
+      </p:bgRef>
+    </p:bg>
+    <p:spTree>
+      <p:nvGrpSpPr>
+        <p:cNvPr id="1" name=""/>
+        <p:cNvGrpSpPr/>
+        <p:nvPr/>
+      </p:nvGrpSpPr>
+      <p:grpSpPr>
+        <a:xfrm>
+          <a:off x="0" y="0"/>
+          <a:ext cx="0" cy="0"/>
+          <a:chOff x="0" y="0"/>
+          <a:chExt cx="0" cy="0"/>
+        </a:xfrm>
+      </p:grpSpPr>
+      <p:sp>
+        <p:nvSpPr>
+          <p:cNvPr id="2" name="页眉占位符 1"/>
+          <p:cNvSpPr>
+            <a:spLocks noGrp="1"/>
+          </p:cNvSpPr>
+          <p:nvPr>
+            <p:ph type="hdr" sz="quarter"/>
+          </p:nvPr>
+        </p:nvSpPr>
+        <p:spPr>
+          <a:xfrm>
+            <a:off x="0" y="0"/>
+            <a:ext cx="2971800" cy="458788"/>
+          </a:xfrm>
+          <a:prstGeom prst="rect">
+            <a:avLst/>
+          </a:prstGeom>
+        </p:spPr>
+        <p:txBody>
+          <a:bodyPr vert="horz" lIns="91440" tIns="45720" rIns="91440" bIns="45720" rtlCol="0"/>
+          <a:lstStyle>
+            <a:lvl1pPr algn="l">
+              <a:defRPr sz="1200"/>
+            </a:lvl1pPr>
+          </a:lstStyle>
+          <a:p>
+            <a:endParaRPr lang="zh-CN" altLang="en-US"/>
+          </a:p>
+        </p:txBody>
+      </p:sp>
+      <p:sp>
+        <p:nvSpPr>
+          <p:cNvPr id="3" name="日期占位符 2"/>
+          <p:cNvSpPr>
+            <a:spLocks noGrp="1"/>
+          </p:cNvSpPr>
+          <p:nvPr>
+            <p:ph type="dt" idx="1"/>
+          </p:nvPr>
+        </p:nvSpPr>
+        <p:spPr>
+          <a:xfrm>
+            <a:off x="3884613" y="0"/>
+            <a:ext cx="2971800" cy="458788"/>
+          </a:xfrm>
+          <a:prstGeom prst="rect">
+            <a:avLst/>
+          </a:prstGeom>
+        </p:spPr>
+        <p:txBody>
+          <a:bodyPr vert="horz" lIns="91440" tIns="45720" rIns="91440" bIns="45720" rtlCol="0"/>
+          <a:lstStyle>
+            <a:lvl1pPr algn="r">
+              <a:defRPr sz="1200"/>
+            </a:lvl1pPr>
+          </a:lstStyle>
+          <a:p>
+            <a:fld id="{35C6DFF6-BE46-4659-9E0D-227762F2D8E1}" type="datetimeFigureOut">
+              <a:rPr lang="zh-CN" altLang="en-US" smtClean="0"/>
+              <a:t>2021/10/27</a:t>
+            </a:fld>
+            <a:endParaRPr lang="zh-CN" altLang="en-US"/>
+          </a:p>
+        </p:txBody>
+      </p:sp>
+      <p:sp>
+        <p:nvSpPr>
+          <p:cNvPr id="4" name="幻灯片图像占位符 3"/>
+          <p:cNvSpPr>
+            <a:spLocks noGrp="1" noRot="1" noChangeAspect="1"/>
+          </p:cNvSpPr>
+          <p:nvPr>
+            <p:ph type="sldImg" idx="2"/>
+          </p:nvPr>
+        </p:nvSpPr>
+        <p:spPr>
+          <a:xfrm>
+            <a:off x="685800" y="1143000"/>
+            <a:ext cx="5486400" cy="3086100"/>
+          </a:xfrm>
+          <a:prstGeom prst="rect">
+            <a:avLst/>
+          </a:prstGeom>
+          <a:noFill/>
+          <a:ln w="12700">
+            <a:solidFill>
+              <a:prstClr val="black"/>
+            </a:solidFill>
+          </a:ln>
+        </p:spPr>
+        <p:txBody>
+          <a:bodyPr vert="horz" lIns="91440" tIns="45720" rIns="91440" bIns="45720" rtlCol="0" anchor="ctr"/>
+          <a:lstStyle/>
+          <a:p>
+            <a:endParaRPr lang="zh-CN" altLang="en-US"/>
+          </a:p>
+        </p:txBody>
+      </p:sp>
+      <p:sp>
+        <p:nvSpPr>
+          <p:cNvPr id="5" name="备注占位符 4"/>
+          <p:cNvSpPr>
+            <a:spLocks noGrp="1"/>
+          </p:cNvSpPr>
+          <p:nvPr>
+            <p:ph type="body" sz="quarter" idx="3"/>
+          </p:nvPr>
+        </p:nvSpPr>
+        <p:spPr>
+          <a:xfrm>
+            <a:off x="685800" y="4400550"/>
+            <a:ext cx="5486400" cy="3600450"/>
+          </a:xfrm>
+          <a:prstGeom prst="rect">
+            <a:avLst/>
+          </a:prstGeom>
+        </p:spPr>
+        <p:txBody>
+          <a:bodyPr vert="horz" lIns="91440" tIns="45720" rIns="91440" bIns="45720" rtlCol="0"/>
+          <a:lstStyle/>
+          <a:p>
+            <a:pPr lvl="0"/>
+            <a:r>
+              <a:rPr lang="zh-CN" altLang="en-US"/>
+              <a:t>编辑母版文本样式</a:t>
+            </a:r>
+          </a:p>
+          <a:p>
+            <a:pPr lvl="1"/>
+            <a:r>
+              <a:rPr lang="zh-CN" altLang="en-US"/>
+              <a:t>第二级</a:t>
+            </a:r>
+          </a:p>
+          <a:p>
+            <a:pPr lvl="2"/>
+            <a:r>
+              <a:rPr lang="zh-CN" altLang="en-US"/>
+              <a:t>第三级</a:t>
+            </a:r>
+          </a:p>
+          <a:p>
+            <a:pPr lvl="3"/>
+            <a:r>
+              <a:rPr lang="zh-CN" altLang="en-US"/>
+              <a:t>第四级</a:t>
+            </a:r>
+          </a:p>
+          <a:p>
+            <a:pPr lvl="4"/>
+            <a:r>
+              <a:rPr lang="zh-CN" altLang="en-US"/>
+              <a:t>第五级</a:t>
+            </a:r>
+          </a:p>
+        </p:txBody>
+      </p:sp>
+      <p:sp>
+        <p:nvSpPr>
+          <p:cNvPr id="6" name="页脚占位符 5"/>
+          <p:cNvSpPr>
+            <a:spLocks noGrp="1"/>
+          </p:cNvSpPr>
+          <p:nvPr>
+            <p:ph type="ftr" sz="quarter" idx="4"/>
+          </p:nvPr>
+        </p:nvSpPr>
+        <p:spPr>
+          <a:xfrm>
+            <a:off x="0" y="8685213"/>
+            <a:ext cx="2971800" cy="458787"/>
+          </a:xfrm>
+          <a:prstGeom prst="rect">
+            <a:avLst/>
+          </a:prstGeom>
+        </p:spPr>
+        <p:txBody>
+          <a:bodyPr vert="horz" lIns="91440" tIns="45720" rIns="91440" bIns="45720" rtlCol="0" anchor="b"/>
+          <a:lstStyle>
+            <a:lvl1pPr algn="l">
+              <a:defRPr sz="1200"/>
+            </a:lvl1pPr>
+          </a:lstStyle>
+          <a:p>
+            <a:endParaRPr lang="zh-CN" altLang="en-US"/>
+          </a:p>
+        </p:txBody>
+      </p:sp>
+      <p:sp>
+        <p:nvSpPr>
+          <p:cNvPr id="7" name="灯片编号占位符 6"/>
+          <p:cNvSpPr>
+            <a:spLocks noGrp="1"/>
+          </p:cNvSpPr>
+          <p:nvPr>
+            <p:ph type="sldNum" sz="quarter" idx="5"/>
+          </p:nvPr>
+        </p:nvSpPr>
+        <p:spPr>
+          <a:xfrm>
+            <a:off x="3884613" y="8685213"/>
+            <a:ext cx="2971800" cy="458787"/>
+          </a:xfrm>
+          <a:prstGeom prst="rect">
+            <a:avLst/>
+          </a:prstGeom>
+        </p:spPr>
+        <p:txBody>
+          <a:bodyPr vert="horz" lIns="91440" tIns="45720" rIns="91440" bIns="45720" rtlCol="0" anchor="b"/>
+          <a:lstStyle>
+            <a:lvl1pPr algn="r">
+              <a:defRPr sz="1200"/>
+            </a:lvl1pPr>
+          </a:lstStyle>
+          <a:p>
+            <a:fld id="{A9B03004-39B8-4B91-936D-5D0E7935EEB2}" type="slidenum">
+              <a:rPr lang="zh-CN" altLang="en-US" smtClean="0"/>
+              <a:t>‹#›</a:t>
+            </a:fld>
+            <a:endParaRPr lang="zh-CN" altLang="en-US"/>
+          </a:p>
+        </p:txBody>
+      </p:sp>
+    </p:spTree>
+    <p:extLst>
+      <p:ext uri="{BB962C8B-B14F-4D97-AF65-F5344CB8AC3E}">
+        <p14:creationId xmlns:p14="http://schemas.microsoft.com/office/powerpoint/2010/main" val="2864596267"/>
+      </p:ext>
+    </p:extLst>
+  </p:cSld>
+  <p:clrMap bg1="lt1" tx1="dk1" bg2="lt2" tx2="dk2" accent1="accent1" accent2="accent2" accent3="accent3" accent4="accent4" accent5="accent5" accent6="accent6" hlink="hlink" folHlink="folHlink"/>
+  <p:notesStyle>
+    <a:lvl1pPr marL="0" algn="l" defTabSz="914400" rtl="0" eaLnBrk="1" latinLnBrk="0" hangingPunct="1">
+      <a:defRPr sz="1200" kern="1200">
+        <a:solidFill>
+          <a:schemeClr val="tx1"/>
+        </a:solidFill>
+        <a:latin typeface="+mn-lt"/>
+        <a:ea typeface="+mn-ea"/>
+        <a:cs typeface="+mn-cs"/>
+      </a:defRPr>
+    </a:lvl1pPr>
+    <a:lvl2pPr marL="457200" algn="l" defTabSz="914400" rtl="0" eaLnBrk="1" latinLnBrk="0" hangingPunct="1">
+      <a:defRPr sz="1200" kern="1200">
+        <a:solidFill>
+          <a:schemeClr val="tx1"/>
+        </a:solidFill>
+        <a:latin typeface="+mn-lt"/>
+        <a:ea typeface="+mn-ea"/>
+        <a:cs typeface="+mn-cs"/>
+      </a:defRPr>
+    </a:lvl2pPr>
+    <a:lvl3pPr marL="914400" algn="l" defTabSz="914400" rtl="0" eaLnBrk="1" latinLnBrk="0" hangingPunct="1">
+      <a:defRPr sz="1200" kern="1200">
+        <a:solidFill>
+          <a:schemeClr val="tx1"/>
+        </a:solidFill>
+        <a:latin typeface="+mn-lt"/>
+        <a:ea typeface="+mn-ea"/>
+        <a:cs typeface="+mn-cs"/>
+      </a:defRPr>
+    </a:lvl3pPr>
+    <a:lvl4pPr marL="1371600" algn="l" defTabSz="914400" rtl="0" eaLnBrk="1" latinLnBrk="0" hangingPunct="1">
+      <a:defRPr sz="1200" kern="1200">
+        <a:solidFill>
+          <a:schemeClr val="tx1"/>
+        </a:solidFill>
+        <a:latin typeface="+mn-lt"/>
+        <a:ea typeface="+mn-ea"/>
+        <a:cs typeface="+mn-cs"/>
+      </a:defRPr>
+    </a:lvl4pPr>
+    <a:lvl5pPr marL="1828800" algn="l" defTabSz="914400" rtl="0" eaLnBrk="1" latinLnBrk="0" hangingPunct="1">
+      <a:defRPr sz="1200" kern="1200">
+        <a:solidFill>
+          <a:schemeClr val="tx1"/>
+        </a:solidFill>
+        <a:latin typeface="+mn-lt"/>
+        <a:ea typeface="+mn-ea"/>
+        <a:cs typeface="+mn-cs"/>
+      </a:defRPr>
+    </a:lvl5pPr>
+    <a:lvl6pPr marL="2286000" algn="l" defTabSz="914400" rtl="0" eaLnBrk="1" latinLnBrk="0" hangingPunct="1">
+      <a:defRPr sz="1200" kern="1200">
+        <a:solidFill>
+          <a:schemeClr val="tx1"/>
+        </a:solidFill>
+        <a:latin typeface="+mn-lt"/>
+        <a:ea typeface="+mn-ea"/>
+        <a:cs typeface="+mn-cs"/>
+      </a:defRPr>
+    </a:lvl6pPr>
+    <a:lvl7pPr marL="2743200" algn="l" defTabSz="914400" rtl="0" eaLnBrk="1" latinLnBrk="0" hangingPunct="1">
+      <a:defRPr sz="1200" kern="1200">
+        <a:solidFill>
+          <a:schemeClr val="tx1"/>
+        </a:solidFill>
+        <a:latin typeface="+mn-lt"/>
+        <a:ea typeface="+mn-ea"/>
+        <a:cs typeface="+mn-cs"/>
+      </a:defRPr>
+    </a:lvl7pPr>
+    <a:lvl8pPr marL="3200400" algn="l" defTabSz="914400" rtl="0" eaLnBrk="1" latinLnBrk="0" hangingPunct="1">
+      <a:defRPr sz="1200" kern="1200">
+        <a:solidFill>
+          <a:schemeClr val="tx1"/>
+        </a:solidFill>
+        <a:latin typeface="+mn-lt"/>
+        <a:ea typeface="+mn-ea"/>
+        <a:cs typeface="+mn-cs"/>
+      </a:defRPr>
+    </a:lvl8pPr>
+    <a:lvl9pPr marL="3657600" algn="l" defTabSz="914400" rtl="0" eaLnBrk="1" latinLnBrk="0" hangingPunct="1">
+      <a:defRPr sz="1200" kern="1200">
+        <a:solidFill>
+          <a:schemeClr val="tx1"/>
+        </a:solidFill>
+        <a:latin typeface="+mn-lt"/>
+        <a:ea typeface="+mn-ea"/>
+        <a:cs typeface="+mn-cs"/>
+      </a:defRPr>
+    </a:lvl9pPr>
+  </p:notesStyle>
+</p:notesMaster>
+</file>
+
+<file path=ppt/notesSlides/notesSlide1.xml><?xml version="1.0" encoding="utf-8"?>
+<p:notes xmlns:a="http://schemas.openxmlformats.org/drawingml/2006/main" xmlns:r="http://schemas.openxmlformats.org/officeDocument/2006/relationships" xmlns:p="http://schemas.openxmlformats.org/presentationml/2006/main">
+  <p:cSld>
+    <p:spTree>
+      <p:nvGrpSpPr>
+        <p:cNvPr id="1" name=""/>
+        <p:cNvGrpSpPr/>
+        <p:nvPr/>
+      </p:nvGrpSpPr>
+      <p:grpSpPr>
+        <a:xfrm>
+          <a:off x="0" y="0"/>
+          <a:ext cx="0" cy="0"/>
+          <a:chOff x="0" y="0"/>
+          <a:chExt cx="0" cy="0"/>
+        </a:xfrm>
+      </p:grpSpPr>
+      <p:sp>
+        <p:nvSpPr>
+          <p:cNvPr id="2" name="幻灯片图像占位符 1"/>
+          <p:cNvSpPr>
+            <a:spLocks noGrp="1" noRot="1" noChangeAspect="1"/>
+          </p:cNvSpPr>
+          <p:nvPr>
+            <p:ph type="sldImg"/>
+          </p:nvPr>
+        </p:nvSpPr>
+        <p:spPr/>
+      </p:sp>
+      <p:sp>
+        <p:nvSpPr>
+          <p:cNvPr id="3" name="备注占位符 2"/>
+          <p:cNvSpPr>
+            <a:spLocks noGrp="1"/>
+          </p:cNvSpPr>
+          <p:nvPr>
+            <p:ph type="body" idx="1"/>
+          </p:nvPr>
+        </p:nvSpPr>
+        <p:spPr/>
+        <p:txBody>
+          <a:bodyPr/>
+          <a:lstStyle/>
+          <a:p>
+            <a:r>
+              <a:rPr lang="en-US" altLang="zh-CN" dirty="0" err="1"/>
+              <a:t>si</a:t>
+            </a:r>
+            <a:r>
+              <a:rPr lang="zh-CN" altLang="en-US" dirty="0"/>
+              <a:t>能够刻画结点</a:t>
+            </a:r>
+            <a:r>
+              <a:rPr lang="en-US" altLang="zh-CN" dirty="0"/>
+              <a:t>vi</a:t>
+            </a:r>
+            <a:r>
+              <a:rPr lang="zh-CN" altLang="en-US" dirty="0"/>
+              <a:t>的邻居结构，实际上我们重构了结点的</a:t>
+            </a:r>
+            <a:r>
+              <a:rPr lang="en-US" altLang="zh-CN" dirty="0"/>
+              <a:t>2</a:t>
+            </a:r>
+            <a:r>
+              <a:rPr lang="zh-CN" altLang="en-US" dirty="0"/>
+              <a:t>阶相似性。</a:t>
+            </a:r>
+            <a:endParaRPr lang="en-US" altLang="zh-CN" dirty="0"/>
+          </a:p>
+          <a:p>
+            <a:r>
+              <a:rPr lang="zh-CN" altLang="en-US" dirty="0"/>
+              <a:t>有边相连则意味着有相似性，没边相连并不意味着没有相似性，因为可能一些合理</a:t>
+            </a:r>
+            <a:r>
+              <a:rPr lang="en-US" altLang="zh-CN" dirty="0"/>
+              <a:t>(legitimate)</a:t>
+            </a:r>
+            <a:r>
+              <a:rPr lang="zh-CN" altLang="en-US" dirty="0"/>
+              <a:t>的边没有被观测</a:t>
+            </a:r>
+            <a:r>
+              <a:rPr lang="en-US" altLang="zh-CN" dirty="0"/>
+              <a:t>(observed)</a:t>
+            </a:r>
+            <a:r>
+              <a:rPr lang="zh-CN" altLang="en-US" dirty="0"/>
+              <a:t>到。</a:t>
+            </a:r>
+            <a:endParaRPr lang="en-US" altLang="zh-CN" dirty="0"/>
+          </a:p>
+          <a:p>
+            <a:r>
+              <a:rPr lang="zh-CN" altLang="en-US" dirty="0"/>
+              <a:t>于是对</a:t>
+            </a:r>
+            <a:r>
+              <a:rPr lang="en-US" altLang="zh-CN" dirty="0"/>
+              <a:t>non-zero element</a:t>
+            </a:r>
+            <a:r>
+              <a:rPr lang="zh-CN" altLang="en-US" dirty="0"/>
+              <a:t>的</a:t>
+            </a:r>
+            <a:r>
+              <a:rPr lang="en-US" altLang="zh-CN" dirty="0"/>
+              <a:t>error</a:t>
+            </a:r>
+            <a:r>
+              <a:rPr lang="zh-CN" altLang="en-US" dirty="0"/>
+              <a:t>施加比</a:t>
+            </a:r>
+            <a:r>
+              <a:rPr lang="en-US" altLang="zh-CN" dirty="0"/>
+              <a:t>zero element</a:t>
+            </a:r>
+            <a:r>
+              <a:rPr lang="zh-CN" altLang="en-US" dirty="0"/>
+              <a:t>的</a:t>
+            </a:r>
+            <a:r>
+              <a:rPr lang="en-US" altLang="zh-CN" dirty="0"/>
+              <a:t>error</a:t>
+            </a:r>
+            <a:r>
+              <a:rPr lang="zh-CN" altLang="en-US" dirty="0"/>
+              <a:t>更多的惩罚，此时也可以允许重构</a:t>
+            </a:r>
+            <a:r>
+              <a:rPr lang="en-US" altLang="zh-CN" dirty="0"/>
+              <a:t>zero element.</a:t>
+            </a:r>
+            <a:endParaRPr lang="zh-CN" altLang="en-US" dirty="0"/>
+          </a:p>
+        </p:txBody>
+      </p:sp>
+      <p:sp>
+        <p:nvSpPr>
+          <p:cNvPr id="4" name="灯片编号占位符 3"/>
+          <p:cNvSpPr>
+            <a:spLocks noGrp="1"/>
+          </p:cNvSpPr>
+          <p:nvPr>
+            <p:ph type="sldNum" sz="quarter" idx="5"/>
+          </p:nvPr>
+        </p:nvSpPr>
+        <p:spPr/>
+        <p:txBody>
+          <a:bodyPr/>
+          <a:lstStyle/>
+          <a:p>
+            <a:fld id="{A9B03004-39B8-4B91-936D-5D0E7935EEB2}" type="slidenum">
+              <a:rPr lang="zh-CN" altLang="en-US" smtClean="0"/>
+              <a:t>3</a:t>
+            </a:fld>
+            <a:endParaRPr lang="zh-CN" altLang="en-US"/>
+          </a:p>
+        </p:txBody>
+      </p:sp>
+    </p:spTree>
+    <p:extLst>
+      <p:ext uri="{BB962C8B-B14F-4D97-AF65-F5344CB8AC3E}">
+        <p14:creationId xmlns:p14="http://schemas.microsoft.com/office/powerpoint/2010/main" val="3925276021"/>
+      </p:ext>
+    </p:extLst>
+  </p:cSld>
+  <p:clrMapOvr>
+    <a:masterClrMapping/>
+  </p:clrMapOvr>
+</p:notes>
+</file>
+
+<file path=ppt/notesSlides/notesSlide2.xml><?xml version="1.0" encoding="utf-8"?>
+<p:notes xmlns:a="http://schemas.openxmlformats.org/drawingml/2006/main" xmlns:r="http://schemas.openxmlformats.org/officeDocument/2006/relationships" xmlns:p="http://schemas.openxmlformats.org/presentationml/2006/main">
+  <p:cSld>
+    <p:spTree>
+      <p:nvGrpSpPr>
+        <p:cNvPr id="1" name=""/>
+        <p:cNvGrpSpPr/>
+        <p:nvPr/>
+      </p:nvGrpSpPr>
+      <p:grpSpPr>
+        <a:xfrm>
+          <a:off x="0" y="0"/>
+          <a:ext cx="0" cy="0"/>
+          <a:chOff x="0" y="0"/>
+          <a:chExt cx="0" cy="0"/>
+        </a:xfrm>
+      </p:grpSpPr>
+      <p:sp>
+        <p:nvSpPr>
+          <p:cNvPr id="2" name="幻灯片图像占位符 1"/>
+          <p:cNvSpPr>
+            <a:spLocks noGrp="1" noRot="1" noChangeAspect="1"/>
+          </p:cNvSpPr>
+          <p:nvPr>
+            <p:ph type="sldImg"/>
+          </p:nvPr>
+        </p:nvSpPr>
+        <p:spPr/>
+      </p:sp>
+      <p:sp>
+        <p:nvSpPr>
+          <p:cNvPr id="3" name="备注占位符 2"/>
+          <p:cNvSpPr>
+            <a:spLocks noGrp="1"/>
+          </p:cNvSpPr>
+          <p:nvPr>
+            <p:ph type="body" idx="1"/>
+          </p:nvPr>
+        </p:nvSpPr>
+        <p:spPr/>
+        <p:txBody>
+          <a:bodyPr/>
+          <a:lstStyle/>
+          <a:p>
+            <a:r>
+              <a:rPr lang="zh-CN" altLang="en-US" dirty="0"/>
+              <a:t>一阶相似性采用了</a:t>
+            </a:r>
+            <a:r>
+              <a:rPr lang="en-US" altLang="zh-CN" dirty="0"/>
+              <a:t>Laplacian Eigenmap</a:t>
+            </a:r>
+            <a:r>
+              <a:rPr lang="zh-CN" altLang="en-US" dirty="0"/>
+              <a:t>的</a:t>
+            </a:r>
+            <a:r>
+              <a:rPr lang="en-US" altLang="zh-CN" dirty="0"/>
+              <a:t>idea</a:t>
+            </a:r>
+            <a:r>
+              <a:rPr lang="zh-CN" altLang="en-US" dirty="0"/>
+              <a:t>，在嵌入空间中两个向量应该尽量接近。</a:t>
+            </a:r>
+          </a:p>
+        </p:txBody>
+      </p:sp>
+      <p:sp>
+        <p:nvSpPr>
+          <p:cNvPr id="4" name="灯片编号占位符 3"/>
+          <p:cNvSpPr>
+            <a:spLocks noGrp="1"/>
+          </p:cNvSpPr>
+          <p:nvPr>
+            <p:ph type="sldNum" sz="quarter" idx="5"/>
+          </p:nvPr>
+        </p:nvSpPr>
+        <p:spPr/>
+        <p:txBody>
+          <a:bodyPr/>
+          <a:lstStyle/>
+          <a:p>
+            <a:fld id="{A9B03004-39B8-4B91-936D-5D0E7935EEB2}" type="slidenum">
+              <a:rPr lang="zh-CN" altLang="en-US" smtClean="0"/>
+              <a:t>4</a:t>
+            </a:fld>
+            <a:endParaRPr lang="zh-CN" altLang="en-US"/>
+          </a:p>
+        </p:txBody>
+      </p:sp>
+    </p:spTree>
+    <p:extLst>
+      <p:ext uri="{BB962C8B-B14F-4D97-AF65-F5344CB8AC3E}">
+        <p14:creationId xmlns:p14="http://schemas.microsoft.com/office/powerpoint/2010/main" val="965053764"/>
+      </p:ext>
+    </p:extLst>
+  </p:cSld>
+  <p:clrMapOvr>
+    <a:masterClrMapping/>
+  </p:clrMapOvr>
+</p:notes>
+</file>
+
+<file path=ppt/notesSlides/notesSlide3.xml><?xml version="1.0" encoding="utf-8"?>
+<p:notes xmlns:a="http://schemas.openxmlformats.org/drawingml/2006/main" xmlns:r="http://schemas.openxmlformats.org/officeDocument/2006/relationships" xmlns:p="http://schemas.openxmlformats.org/presentationml/2006/main">
+  <p:cSld>
+    <p:spTree>
+      <p:nvGrpSpPr>
+        <p:cNvPr id="1" name=""/>
+        <p:cNvGrpSpPr/>
+        <p:nvPr/>
+      </p:nvGrpSpPr>
+      <p:grpSpPr>
+        <a:xfrm>
+          <a:off x="0" y="0"/>
+          <a:ext cx="0" cy="0"/>
+          <a:chOff x="0" y="0"/>
+          <a:chExt cx="0" cy="0"/>
+        </a:xfrm>
+      </p:grpSpPr>
+      <p:sp>
+        <p:nvSpPr>
+          <p:cNvPr id="2" name="幻灯片图像占位符 1"/>
+          <p:cNvSpPr>
+            <a:spLocks noGrp="1" noRot="1" noChangeAspect="1"/>
+          </p:cNvSpPr>
+          <p:nvPr>
+            <p:ph type="sldImg"/>
+          </p:nvPr>
+        </p:nvSpPr>
+        <p:spPr/>
+      </p:sp>
+      <p:sp>
+        <p:nvSpPr>
+          <p:cNvPr id="3" name="备注占位符 2"/>
+          <p:cNvSpPr>
+            <a:spLocks noGrp="1"/>
+          </p:cNvSpPr>
+          <p:nvPr>
+            <p:ph type="body" idx="1"/>
+          </p:nvPr>
+        </p:nvSpPr>
+        <p:spPr/>
+        <p:txBody>
+          <a:bodyPr/>
+          <a:lstStyle/>
+          <a:p>
+            <a:r>
+              <a:rPr lang="zh-CN" altLang="en-US" dirty="0"/>
+              <a:t>通过图嵌入学习到结点向量表示（特征）后，用</a:t>
+            </a:r>
+            <a:r>
+              <a:rPr lang="en-US" altLang="zh-CN" dirty="0"/>
+              <a:t>LIBLINEAR package </a:t>
+            </a:r>
+            <a:r>
+              <a:rPr lang="zh-CN" altLang="en-US" dirty="0"/>
+              <a:t>训练分类器。</a:t>
+            </a:r>
+            <a:endParaRPr lang="en-US" altLang="zh-CN" dirty="0"/>
+          </a:p>
+          <a:p>
+            <a:r>
+              <a:rPr lang="zh-CN" altLang="en-US" dirty="0"/>
+              <a:t>训练时，随机选择一部分</a:t>
+            </a:r>
+            <a:r>
+              <a:rPr lang="en-US" altLang="zh-CN" dirty="0"/>
+              <a:t>label nodes</a:t>
+            </a:r>
+            <a:r>
+              <a:rPr lang="zh-CN" altLang="en-US" dirty="0"/>
+              <a:t>作为</a:t>
+            </a:r>
+            <a:r>
+              <a:rPr lang="en-US" altLang="zh-CN" dirty="0"/>
+              <a:t>training data</a:t>
+            </a:r>
+            <a:r>
+              <a:rPr lang="zh-CN" altLang="en-US" dirty="0"/>
+              <a:t>，其他作为</a:t>
+            </a:r>
+            <a:r>
+              <a:rPr lang="en-US" altLang="zh-CN" dirty="0"/>
+              <a:t>test</a:t>
+            </a:r>
+            <a:r>
+              <a:rPr lang="zh-CN" altLang="en-US" dirty="0"/>
+              <a:t>。</a:t>
+            </a:r>
+            <a:endParaRPr lang="en-US" altLang="zh-CN" dirty="0"/>
+          </a:p>
+          <a:p>
+            <a:r>
+              <a:rPr lang="zh-CN" altLang="en-US" dirty="0"/>
+              <a:t>这里的</a:t>
+            </a:r>
+            <a:r>
+              <a:rPr lang="en-US" altLang="zh-CN" dirty="0"/>
+              <a:t>percentage</a:t>
+            </a:r>
+            <a:r>
+              <a:rPr lang="zh-CN" altLang="en-US" dirty="0"/>
+              <a:t>为选择训练结点的比例。</a:t>
+            </a:r>
+            <a:r>
+              <a:rPr lang="en-US" altLang="zh-CN" dirty="0"/>
+              <a:t> </a:t>
+            </a:r>
+            <a:endParaRPr lang="zh-CN" altLang="en-US" dirty="0"/>
+          </a:p>
+        </p:txBody>
+      </p:sp>
+      <p:sp>
+        <p:nvSpPr>
+          <p:cNvPr id="4" name="灯片编号占位符 3"/>
+          <p:cNvSpPr>
+            <a:spLocks noGrp="1"/>
+          </p:cNvSpPr>
+          <p:nvPr>
+            <p:ph type="sldNum" sz="quarter" idx="5"/>
+          </p:nvPr>
+        </p:nvSpPr>
+        <p:spPr/>
+        <p:txBody>
+          <a:bodyPr/>
+          <a:lstStyle/>
+          <a:p>
+            <a:fld id="{A9B03004-39B8-4B91-936D-5D0E7935EEB2}" type="slidenum">
+              <a:rPr lang="zh-CN" altLang="en-US" smtClean="0"/>
+              <a:t>7</a:t>
+            </a:fld>
+            <a:endParaRPr lang="zh-CN" altLang="en-US"/>
+          </a:p>
+        </p:txBody>
+      </p:sp>
+    </p:spTree>
+    <p:extLst>
+      <p:ext uri="{BB962C8B-B14F-4D97-AF65-F5344CB8AC3E}">
+        <p14:creationId xmlns:p14="http://schemas.microsoft.com/office/powerpoint/2010/main" val="3174996618"/>
+      </p:ext>
+    </p:extLst>
+  </p:cSld>
+  <p:clrMapOvr>
+    <a:masterClrMapping/>
+  </p:clrMapOvr>
+</p:notes>
 </file>
 
 <file path=ppt/slideLayouts/slideLayout1.xml><?xml version="1.0" encoding="utf-8"?>
@@ -3366,6 +4153,175 @@
 </p:sld>
 </file>
 
+<file path=ppt/slides/slide10.xml><?xml version="1.0" encoding="utf-8"?>
+<p:sld xmlns:a="http://schemas.openxmlformats.org/drawingml/2006/main" xmlns:r="http://schemas.openxmlformats.org/officeDocument/2006/relationships" xmlns:p="http://schemas.openxmlformats.org/presentationml/2006/main">
+  <p:cSld>
+    <p:spTree>
+      <p:nvGrpSpPr>
+        <p:cNvPr id="1" name=""/>
+        <p:cNvGrpSpPr/>
+        <p:nvPr/>
+      </p:nvGrpSpPr>
+      <p:grpSpPr>
+        <a:xfrm>
+          <a:off x="0" y="0"/>
+          <a:ext cx="0" cy="0"/>
+          <a:chOff x="0" y="0"/>
+          <a:chExt cx="0" cy="0"/>
+        </a:xfrm>
+      </p:grpSpPr>
+      <p:pic>
+        <p:nvPicPr>
+          <p:cNvPr id="7" name="图片 6">
+            <a:extLst>
+              <a:ext uri="{FF2B5EF4-FFF2-40B4-BE49-F238E27FC236}">
+                <a16:creationId xmlns:a16="http://schemas.microsoft.com/office/drawing/2014/main" id="{4F9FF6C0-8EE3-4842-842E-C6F610864DE4}"/>
+              </a:ext>
+            </a:extLst>
+          </p:cNvPr>
+          <p:cNvPicPr>
+            <a:picLocks noChangeAspect="1"/>
+          </p:cNvPicPr>
+          <p:nvPr/>
+        </p:nvPicPr>
+        <p:blipFill>
+          <a:blip r:embed="rId2"/>
+          <a:stretch>
+            <a:fillRect/>
+          </a:stretch>
+        </p:blipFill>
+        <p:spPr>
+          <a:xfrm>
+            <a:off x="123825" y="1190878"/>
+            <a:ext cx="11224474" cy="3853043"/>
+          </a:xfrm>
+          <a:prstGeom prst="rect">
+            <a:avLst/>
+          </a:prstGeom>
+        </p:spPr>
+      </p:pic>
+      <p:sp>
+        <p:nvSpPr>
+          <p:cNvPr id="8" name="矩形 7">
+            <a:extLst>
+              <a:ext uri="{FF2B5EF4-FFF2-40B4-BE49-F238E27FC236}">
+                <a16:creationId xmlns:a16="http://schemas.microsoft.com/office/drawing/2014/main" id="{DF518F1D-8A7C-42BD-9FAC-2655A6E303BE}"/>
+              </a:ext>
+            </a:extLst>
+          </p:cNvPr>
+          <p:cNvSpPr/>
+          <p:nvPr/>
+        </p:nvSpPr>
+        <p:spPr>
+          <a:xfrm>
+            <a:off x="323183" y="5453107"/>
+            <a:ext cx="5873467" cy="923330"/>
+          </a:xfrm>
+          <a:prstGeom prst="rect">
+            <a:avLst/>
+          </a:prstGeom>
+        </p:spPr>
+        <p:txBody>
+          <a:bodyPr wrap="none">
+            <a:spAutoFit/>
+          </a:bodyPr>
+          <a:lstStyle/>
+          <a:p>
+            <a:pPr marL="285750" indent="-285750">
+              <a:buFont typeface="Arial" panose="020B0604020202020204" pitchFamily="34" charset="0"/>
+              <a:buChar char="•"/>
+            </a:pPr>
+            <a:r>
+              <a:rPr lang="en-US" altLang="zh-CN" dirty="0">
+                <a:latin typeface="Calibri" panose="020F0502020204030204" pitchFamily="34" charset="0"/>
+                <a:cs typeface="Calibri" panose="020F0502020204030204" pitchFamily="34" charset="0"/>
+              </a:rPr>
+              <a:t>Embedding dimensions.</a:t>
+            </a:r>
+          </a:p>
+          <a:p>
+            <a:pPr marL="285750" indent="-285750">
+              <a:buFont typeface="Arial" panose="020B0604020202020204" pitchFamily="34" charset="0"/>
+              <a:buChar char="•"/>
+            </a:pPr>
+            <a:r>
+              <a:rPr lang="en-US" altLang="zh-CN" dirty="0">
+                <a:latin typeface="Calibri" panose="020F0502020204030204" pitchFamily="34" charset="0"/>
+                <a:cs typeface="Calibri" panose="020F0502020204030204" pitchFamily="34" charset="0"/>
+              </a:rPr>
+              <a:t>Balance between first-order and second-order proximity.</a:t>
+            </a:r>
+          </a:p>
+          <a:p>
+            <a:pPr marL="285750" indent="-285750">
+              <a:buFont typeface="Arial" panose="020B0604020202020204" pitchFamily="34" charset="0"/>
+              <a:buChar char="•"/>
+            </a:pPr>
+            <a:r>
+              <a:rPr lang="en-US" altLang="zh-CN" dirty="0">
+                <a:latin typeface="Calibri" panose="020F0502020204030204" pitchFamily="34" charset="0"/>
+                <a:cs typeface="Calibri" panose="020F0502020204030204" pitchFamily="34" charset="0"/>
+              </a:rPr>
+              <a:t>Balance between reconstruct nonzero and zero elements.</a:t>
+            </a:r>
+            <a:endParaRPr lang="zh-CN" altLang="en-US" dirty="0"/>
+          </a:p>
+        </p:txBody>
+      </p:sp>
+      <p:sp>
+        <p:nvSpPr>
+          <p:cNvPr id="9" name="矩形 8">
+            <a:extLst>
+              <a:ext uri="{FF2B5EF4-FFF2-40B4-BE49-F238E27FC236}">
+                <a16:creationId xmlns:a16="http://schemas.microsoft.com/office/drawing/2014/main" id="{D4AB9EA0-F65F-4A2A-A085-8F4413FD1CDF}"/>
+              </a:ext>
+            </a:extLst>
+          </p:cNvPr>
+          <p:cNvSpPr/>
+          <p:nvPr/>
+        </p:nvSpPr>
+        <p:spPr>
+          <a:xfrm>
+            <a:off x="123825" y="401510"/>
+            <a:ext cx="3816238" cy="584775"/>
+          </a:xfrm>
+          <a:prstGeom prst="rect">
+            <a:avLst/>
+          </a:prstGeom>
+        </p:spPr>
+        <p:txBody>
+          <a:bodyPr wrap="none">
+            <a:spAutoFit/>
+          </a:bodyPr>
+          <a:lstStyle/>
+          <a:p>
+            <a:r>
+              <a:rPr lang="en-US" altLang="zh-CN" sz="3200" b="1" dirty="0">
+                <a:solidFill>
+                  <a:prstClr val="black"/>
+                </a:solidFill>
+                <a:latin typeface="Calibri" panose="020F0502020204030204" pitchFamily="34" charset="0"/>
+                <a:cs typeface="Calibri" panose="020F0502020204030204" pitchFamily="34" charset="0"/>
+              </a:rPr>
+              <a:t>Parameter Sensitivity</a:t>
+            </a:r>
+            <a:endParaRPr lang="zh-CN" altLang="en-US" sz="1600" dirty="0"/>
+          </a:p>
+        </p:txBody>
+      </p:sp>
+    </p:spTree>
+    <p:extLst>
+      <p:ext uri="{BB962C8B-B14F-4D97-AF65-F5344CB8AC3E}">
+        <p14:creationId xmlns:p14="http://schemas.microsoft.com/office/powerpoint/2010/main" val="907141632"/>
+      </p:ext>
+    </p:extLst>
+  </p:cSld>
+  <p:clrMapOvr>
+    <a:masterClrMapping/>
+  </p:clrMapOvr>
+</p:sld>
+</file>
+
 <file path=ppt/slides/slide2.xml><?xml version="1.0" encoding="utf-8"?>
 <p:sld xmlns:a="http://schemas.openxmlformats.org/drawingml/2006/main" xmlns:r="http://schemas.openxmlformats.org/officeDocument/2006/relationships" xmlns:p="http://schemas.openxmlformats.org/presentationml/2006/main">
   <p:cSld>
@@ -3475,7 +4431,7 @@
                 <a:latin typeface="Calibri" panose="020F0502020204030204" pitchFamily="34" charset="0"/>
                 <a:cs typeface="Calibri" panose="020F0502020204030204" pitchFamily="34" charset="0"/>
               </a:rPr>
-              <a:t>no enough to reach a good performance.</a:t>
+              <a:t>not enough to reach a good performance.</a:t>
             </a:r>
             <a:endParaRPr lang="zh-CN" altLang="en-US" sz="2000" dirty="0">
               <a:latin typeface="Calibri" panose="020F0502020204030204" pitchFamily="34" charset="0"/>
@@ -3984,15 +4940,1299 @@
           <p:nvPr/>
         </p:nvPicPr>
         <p:blipFill>
-          <a:blip r:embed="rId2"/>
+          <a:blip r:embed="rId3"/>
           <a:stretch>
             <a:fillRect/>
           </a:stretch>
         </p:blipFill>
         <p:spPr>
           <a:xfrm>
-            <a:off x="400693" y="558687"/>
+            <a:off x="303348" y="558687"/>
             <a:ext cx="5861351" cy="4369025"/>
+          </a:xfrm>
+          <a:prstGeom prst="rect">
+            <a:avLst/>
+          </a:prstGeom>
+        </p:spPr>
+      </p:pic>
+      <p:pic>
+        <p:nvPicPr>
+          <p:cNvPr id="2" name="图片 1">
+            <a:extLst>
+              <a:ext uri="{FF2B5EF4-FFF2-40B4-BE49-F238E27FC236}">
+                <a16:creationId xmlns:a16="http://schemas.microsoft.com/office/drawing/2014/main" id="{82CDF4F7-6B6D-461E-ADFD-24EEC86426C2}"/>
+              </a:ext>
+            </a:extLst>
+          </p:cNvPr>
+          <p:cNvPicPr>
+            <a:picLocks noChangeAspect="1"/>
+          </p:cNvPicPr>
+          <p:nvPr/>
+        </p:nvPicPr>
+        <p:blipFill>
+          <a:blip r:embed="rId4"/>
+          <a:stretch>
+            <a:fillRect/>
+          </a:stretch>
+        </p:blipFill>
+        <p:spPr>
+          <a:xfrm>
+            <a:off x="6744830" y="558687"/>
+            <a:ext cx="4809524" cy="933333"/>
+          </a:xfrm>
+          <a:prstGeom prst="rect">
+            <a:avLst/>
+          </a:prstGeom>
+        </p:spPr>
+      </p:pic>
+      <p:sp>
+        <p:nvSpPr>
+          <p:cNvPr id="3" name="矩形 2">
+            <a:extLst>
+              <a:ext uri="{FF2B5EF4-FFF2-40B4-BE49-F238E27FC236}">
+                <a16:creationId xmlns:a16="http://schemas.microsoft.com/office/drawing/2014/main" id="{C1393A89-A3BB-4228-A74C-E624C836A54D}"/>
+              </a:ext>
+            </a:extLst>
+          </p:cNvPr>
+          <p:cNvSpPr/>
+          <p:nvPr/>
+        </p:nvSpPr>
+        <p:spPr>
+          <a:xfrm>
+            <a:off x="271824" y="5586330"/>
+            <a:ext cx="6467733" cy="923330"/>
+          </a:xfrm>
+          <a:prstGeom prst="rect">
+            <a:avLst/>
+          </a:prstGeom>
+        </p:spPr>
+        <p:txBody>
+          <a:bodyPr wrap="none">
+            <a:spAutoFit/>
+          </a:bodyPr>
+          <a:lstStyle/>
+          <a:p>
+            <a:r>
+              <a:rPr lang="en-US" altLang="zh-CN" b="1" dirty="0">
+                <a:latin typeface="Calibri" panose="020F0502020204030204" pitchFamily="34" charset="0"/>
+                <a:cs typeface="Calibri" panose="020F0502020204030204" pitchFamily="34" charset="0"/>
+              </a:rPr>
+              <a:t>Unsupervised component</a:t>
+            </a:r>
+            <a:r>
+              <a:rPr lang="en-US" altLang="zh-CN" dirty="0">
+                <a:latin typeface="Calibri" panose="020F0502020204030204" pitchFamily="34" charset="0"/>
+                <a:cs typeface="Calibri" panose="020F0502020204030204" pitchFamily="34" charset="0"/>
+              </a:rPr>
+              <a:t>: </a:t>
+            </a:r>
+            <a:r>
+              <a:rPr lang="en-US" altLang="zh-CN" dirty="0">
+                <a:solidFill>
+                  <a:prstClr val="black"/>
+                </a:solidFill>
+                <a:latin typeface="Calibri" panose="020F0502020204030204" pitchFamily="34" charset="0"/>
+                <a:cs typeface="Calibri" panose="020F0502020204030204" pitchFamily="34" charset="0"/>
+              </a:rPr>
+              <a:t>Autoencoder</a:t>
+            </a:r>
+          </a:p>
+          <a:p>
+            <a:pPr marL="285750" indent="-285750">
+              <a:buFont typeface="Arial" panose="020B0604020202020204" pitchFamily="34" charset="0"/>
+              <a:buChar char="•"/>
+            </a:pPr>
+            <a:r>
+              <a:rPr lang="en-US" altLang="zh-CN" dirty="0">
+                <a:latin typeface="Calibri" panose="020F0502020204030204" pitchFamily="34" charset="0"/>
+                <a:cs typeface="Calibri" panose="020F0502020204030204" pitchFamily="34" charset="0"/>
+              </a:rPr>
+              <a:t>Encoder: Map the input data to the representation space</a:t>
+            </a:r>
+          </a:p>
+          <a:p>
+            <a:pPr marL="285750" indent="-285750">
+              <a:buFont typeface="Arial" panose="020B0604020202020204" pitchFamily="34" charset="0"/>
+              <a:buChar char="•"/>
+            </a:pPr>
+            <a:r>
+              <a:rPr lang="en-US" altLang="zh-CN" dirty="0">
+                <a:latin typeface="Calibri" panose="020F0502020204030204" pitchFamily="34" charset="0"/>
+                <a:cs typeface="Calibri" panose="020F0502020204030204" pitchFamily="34" charset="0"/>
+              </a:rPr>
+              <a:t>Decoder: Map the representation space to reconstruction space</a:t>
+            </a:r>
+            <a:endParaRPr lang="zh-CN" altLang="en-US" dirty="0">
+              <a:latin typeface="Calibri" panose="020F0502020204030204" pitchFamily="34" charset="0"/>
+              <a:cs typeface="Calibri" panose="020F0502020204030204" pitchFamily="34" charset="0"/>
+            </a:endParaRPr>
+          </a:p>
+        </p:txBody>
+      </p:sp>
+      <p:pic>
+        <p:nvPicPr>
+          <p:cNvPr id="4" name="图片 3">
+            <a:extLst>
+              <a:ext uri="{FF2B5EF4-FFF2-40B4-BE49-F238E27FC236}">
+                <a16:creationId xmlns:a16="http://schemas.microsoft.com/office/drawing/2014/main" id="{7B382206-2175-465C-A07A-D93558DA3ECF}"/>
+              </a:ext>
+            </a:extLst>
+          </p:cNvPr>
+          <p:cNvPicPr>
+            <a:picLocks noChangeAspect="1"/>
+          </p:cNvPicPr>
+          <p:nvPr/>
+        </p:nvPicPr>
+        <p:blipFill>
+          <a:blip r:embed="rId5"/>
+          <a:stretch>
+            <a:fillRect/>
+          </a:stretch>
+        </p:blipFill>
+        <p:spPr>
+          <a:xfrm>
+            <a:off x="6771081" y="1803793"/>
+            <a:ext cx="2423761" cy="652865"/>
+          </a:xfrm>
+          <a:prstGeom prst="rect">
+            <a:avLst/>
+          </a:prstGeom>
+        </p:spPr>
+      </p:pic>
+      <mc:AlternateContent xmlns:mc="http://schemas.openxmlformats.org/markup-compatibility/2006">
+        <mc:Choice xmlns:a14="http://schemas.microsoft.com/office/drawing/2010/main" Requires="a14">
+          <p:sp>
+            <p:nvSpPr>
+              <p:cNvPr id="6" name="矩形 5">
+                <a:extLst>
+                  <a:ext uri="{FF2B5EF4-FFF2-40B4-BE49-F238E27FC236}">
+                    <a16:creationId xmlns:a16="http://schemas.microsoft.com/office/drawing/2014/main" id="{168C56E5-D147-44D9-8965-6A5C8F143794}"/>
+                  </a:ext>
+                </a:extLst>
+              </p:cNvPr>
+              <p:cNvSpPr/>
+              <p:nvPr/>
+            </p:nvSpPr>
+            <p:spPr>
+              <a:xfrm>
+                <a:off x="6744830" y="2908748"/>
+                <a:ext cx="4435573" cy="646331"/>
+              </a:xfrm>
+              <a:prstGeom prst="rect">
+                <a:avLst/>
+              </a:prstGeom>
+            </p:spPr>
+            <p:txBody>
+              <a:bodyPr wrap="none">
+                <a:spAutoFit/>
+              </a:bodyPr>
+              <a:lstStyle/>
+              <a:p>
+                <a:r>
+                  <a:rPr lang="en-US" altLang="zh-CN" dirty="0">
+                    <a:latin typeface="Calibri" panose="020F0502020204030204" pitchFamily="34" charset="0"/>
+                    <a:cs typeface="Calibri" panose="020F0502020204030204" pitchFamily="34" charset="0"/>
+                  </a:rPr>
+                  <a:t>Using adjacent matrix </a:t>
+                </a:r>
+                <a14:m>
+                  <m:oMath xmlns:m="http://schemas.openxmlformats.org/officeDocument/2006/math">
+                    <m:r>
+                      <a:rPr lang="en-US" altLang="zh-CN" b="0" i="1" smtClean="0">
+                        <a:latin typeface="Cambria Math" panose="02040503050406030204" pitchFamily="18" charset="0"/>
+                        <a:cs typeface="Calibri" panose="020F0502020204030204" pitchFamily="34" charset="0"/>
+                      </a:rPr>
+                      <m:t>𝑆</m:t>
+                    </m:r>
+                  </m:oMath>
+                </a14:m>
+                <a:r>
+                  <a:rPr lang="zh-CN" altLang="en-US" dirty="0"/>
+                  <a:t> </a:t>
+                </a:r>
+                <a:r>
+                  <a:rPr lang="en-US" altLang="zh-CN" dirty="0">
+                    <a:latin typeface="Calibri" panose="020F0502020204030204" pitchFamily="34" charset="0"/>
+                    <a:cs typeface="Calibri" panose="020F0502020204030204" pitchFamily="34" charset="0"/>
+                  </a:rPr>
+                  <a:t>as the input, </a:t>
+                </a:r>
+                <a14:m>
+                  <m:oMath xmlns:m="http://schemas.openxmlformats.org/officeDocument/2006/math">
+                    <m:sSub>
+                      <m:sSubPr>
+                        <m:ctrlPr>
+                          <a:rPr lang="en-US" altLang="zh-CN" b="0" i="1" smtClean="0">
+                            <a:latin typeface="Cambria Math" panose="02040503050406030204" pitchFamily="18" charset="0"/>
+                          </a:rPr>
+                        </m:ctrlPr>
+                      </m:sSubPr>
+                      <m:e>
+                        <m:r>
+                          <a:rPr lang="en-US" altLang="zh-CN" b="1" i="0" smtClean="0">
+                            <a:latin typeface="Cambria Math" panose="02040503050406030204" pitchFamily="18" charset="0"/>
+                          </a:rPr>
+                          <m:t>𝐱</m:t>
+                        </m:r>
+                      </m:e>
+                      <m:sub>
+                        <m:r>
+                          <a:rPr lang="en-US" altLang="zh-CN" b="0" i="1" smtClean="0">
+                            <a:latin typeface="Cambria Math" panose="02040503050406030204" pitchFamily="18" charset="0"/>
+                          </a:rPr>
+                          <m:t>𝑖</m:t>
+                        </m:r>
+                      </m:sub>
+                    </m:sSub>
+                    <m:r>
+                      <a:rPr lang="en-US" altLang="zh-CN" b="0" i="1" smtClean="0">
+                        <a:latin typeface="Cambria Math" panose="02040503050406030204" pitchFamily="18" charset="0"/>
+                      </a:rPr>
+                      <m:t>=</m:t>
+                    </m:r>
+                    <m:sSub>
+                      <m:sSubPr>
+                        <m:ctrlPr>
+                          <a:rPr lang="en-US" altLang="zh-CN" b="0" i="1" smtClean="0">
+                            <a:latin typeface="Cambria Math" panose="02040503050406030204" pitchFamily="18" charset="0"/>
+                          </a:rPr>
+                        </m:ctrlPr>
+                      </m:sSubPr>
+                      <m:e>
+                        <m:r>
+                          <a:rPr lang="en-US" altLang="zh-CN" b="1" i="0" smtClean="0">
+                            <a:latin typeface="Cambria Math" panose="02040503050406030204" pitchFamily="18" charset="0"/>
+                          </a:rPr>
+                          <m:t>𝐬</m:t>
+                        </m:r>
+                      </m:e>
+                      <m:sub>
+                        <m:r>
+                          <a:rPr lang="en-US" altLang="zh-CN" b="0" i="1" smtClean="0">
+                            <a:latin typeface="Cambria Math" panose="02040503050406030204" pitchFamily="18" charset="0"/>
+                          </a:rPr>
+                          <m:t>𝑖</m:t>
+                        </m:r>
+                      </m:sub>
+                    </m:sSub>
+                  </m:oMath>
+                </a14:m>
+                <a:r>
+                  <a:rPr lang="en-US" altLang="zh-CN" b="0" dirty="0">
+                    <a:latin typeface="Calibri" panose="020F0502020204030204" pitchFamily="34" charset="0"/>
+                  </a:rPr>
+                  <a:t>,</a:t>
+                </a:r>
+              </a:p>
+              <a:p>
+                <a:r>
+                  <a:rPr lang="en-US" altLang="zh-CN" b="0" dirty="0">
+                    <a:latin typeface="Calibri" panose="020F0502020204030204" pitchFamily="34" charset="0"/>
+                  </a:rPr>
+                  <a:t>Reconstructing the second-order proximity.</a:t>
+                </a:r>
+              </a:p>
+            </p:txBody>
+          </p:sp>
+        </mc:Choice>
+        <mc:Fallback>
+          <p:sp>
+            <p:nvSpPr>
+              <p:cNvPr id="6" name="矩形 5">
+                <a:extLst>
+                  <a:ext uri="{FF2B5EF4-FFF2-40B4-BE49-F238E27FC236}">
+                    <a16:creationId xmlns:a16="http://schemas.microsoft.com/office/drawing/2014/main" id="{168C56E5-D147-44D9-8965-6A5C8F143794}"/>
+                  </a:ext>
+                </a:extLst>
+              </p:cNvPr>
+              <p:cNvSpPr>
+                <a:spLocks noRot="1" noChangeAspect="1" noMove="1" noResize="1" noEditPoints="1" noAdjustHandles="1" noChangeArrowheads="1" noChangeShapeType="1" noTextEdit="1"/>
+              </p:cNvSpPr>
+              <p:nvPr/>
+            </p:nvSpPr>
+            <p:spPr>
+              <a:xfrm>
+                <a:off x="6744830" y="2908748"/>
+                <a:ext cx="4435573" cy="646331"/>
+              </a:xfrm>
+              <a:prstGeom prst="rect">
+                <a:avLst/>
+              </a:prstGeom>
+              <a:blipFill>
+                <a:blip r:embed="rId6"/>
+                <a:stretch>
+                  <a:fillRect l="-1099" t="-4717" r="-275" b="-14151"/>
+                </a:stretch>
+              </a:blipFill>
+            </p:spPr>
+            <p:txBody>
+              <a:bodyPr/>
+              <a:lstStyle/>
+              <a:p>
+                <a:r>
+                  <a:rPr lang="zh-CN" altLang="en-US">
+                    <a:noFill/>
+                  </a:rPr>
+                  <a:t> </a:t>
+                </a:r>
+              </a:p>
+            </p:txBody>
+          </p:sp>
+        </mc:Fallback>
+      </mc:AlternateContent>
+      <p:pic>
+        <p:nvPicPr>
+          <p:cNvPr id="7" name="图片 6">
+            <a:extLst>
+              <a:ext uri="{FF2B5EF4-FFF2-40B4-BE49-F238E27FC236}">
+                <a16:creationId xmlns:a16="http://schemas.microsoft.com/office/drawing/2014/main" id="{98608BE1-39D1-49FB-89B5-D76A94FDD706}"/>
+              </a:ext>
+            </a:extLst>
+          </p:cNvPr>
+          <p:cNvPicPr>
+            <a:picLocks noChangeAspect="1"/>
+          </p:cNvPicPr>
+          <p:nvPr/>
+        </p:nvPicPr>
+        <p:blipFill>
+          <a:blip r:embed="rId7"/>
+          <a:stretch>
+            <a:fillRect/>
+          </a:stretch>
+        </p:blipFill>
+        <p:spPr>
+          <a:xfrm>
+            <a:off x="7064426" y="4909454"/>
+            <a:ext cx="3136017" cy="995686"/>
+          </a:xfrm>
+          <a:prstGeom prst="rect">
+            <a:avLst/>
+          </a:prstGeom>
+        </p:spPr>
+      </p:pic>
+      <p:sp>
+        <p:nvSpPr>
+          <p:cNvPr id="8" name="矩形 7">
+            <a:extLst>
+              <a:ext uri="{FF2B5EF4-FFF2-40B4-BE49-F238E27FC236}">
+                <a16:creationId xmlns:a16="http://schemas.microsoft.com/office/drawing/2014/main" id="{BECCEE6C-A22B-4A8C-B9B6-8956F1239446}"/>
+              </a:ext>
+            </a:extLst>
+          </p:cNvPr>
+          <p:cNvSpPr/>
+          <p:nvPr/>
+        </p:nvSpPr>
+        <p:spPr>
+          <a:xfrm>
+            <a:off x="6771081" y="4157234"/>
+            <a:ext cx="4324350" cy="646331"/>
+          </a:xfrm>
+          <a:prstGeom prst="rect">
+            <a:avLst/>
+          </a:prstGeom>
+        </p:spPr>
+        <p:txBody>
+          <a:bodyPr wrap="square">
+            <a:spAutoFit/>
+          </a:bodyPr>
+          <a:lstStyle/>
+          <a:p>
+            <a:r>
+              <a:rPr lang="en-US" altLang="zh-CN" dirty="0">
+                <a:latin typeface="Calibri" panose="020F0502020204030204" pitchFamily="34" charset="0"/>
+                <a:cs typeface="Calibri" panose="020F0502020204030204" pitchFamily="34" charset="0"/>
+              </a:rPr>
+              <a:t>Due to the sparsity, neural networks are more prone to reconstruct zero elements.</a:t>
+            </a:r>
+            <a:endParaRPr lang="zh-CN" altLang="en-US" dirty="0"/>
+          </a:p>
+        </p:txBody>
+      </p:sp>
+      <mc:AlternateContent xmlns:mc="http://schemas.openxmlformats.org/markup-compatibility/2006">
+        <mc:Choice xmlns:a14="http://schemas.microsoft.com/office/drawing/2010/main" Requires="a14">
+          <p:sp>
+            <p:nvSpPr>
+              <p:cNvPr id="9" name="文本框 8">
+                <a:extLst>
+                  <a:ext uri="{FF2B5EF4-FFF2-40B4-BE49-F238E27FC236}">
+                    <a16:creationId xmlns:a16="http://schemas.microsoft.com/office/drawing/2014/main" id="{FE40DABD-8549-4CD4-BB1F-40152A8FBA54}"/>
+                  </a:ext>
+                </a:extLst>
+              </p:cNvPr>
+              <p:cNvSpPr txBox="1"/>
+              <p:nvPr/>
+            </p:nvSpPr>
+            <p:spPr>
+              <a:xfrm>
+                <a:off x="7135355" y="6136801"/>
+                <a:ext cx="1222642" cy="372859"/>
+              </a:xfrm>
+              <a:prstGeom prst="rect">
+                <a:avLst/>
+              </a:prstGeom>
+              <a:noFill/>
+            </p:spPr>
+            <p:txBody>
+              <a:bodyPr wrap="none" lIns="0" tIns="0" rIns="0" bIns="0" rtlCol="0">
+                <a:spAutoFit/>
+              </a:bodyPr>
+              <a:lstStyle/>
+              <a:p>
+                <a14:m>
+                  <m:oMathPara xmlns:m="http://schemas.openxmlformats.org/officeDocument/2006/math">
+                    <m:oMathParaPr>
+                      <m:jc m:val="centerGroup"/>
+                    </m:oMathParaPr>
+                    <m:oMath xmlns:m="http://schemas.openxmlformats.org/officeDocument/2006/math">
+                      <m:sSub>
+                        <m:sSubPr>
+                          <m:ctrlPr>
+                            <a:rPr lang="zh-CN" altLang="en-US" sz="1600" b="1" smtClean="0">
+                              <a:latin typeface="Cambria Math" panose="02040503050406030204" pitchFamily="18" charset="0"/>
+                            </a:rPr>
+                          </m:ctrlPr>
+                        </m:sSubPr>
+                        <m:e>
+                          <m:r>
+                            <a:rPr lang="zh-CN" altLang="en-US" sz="1600" b="1" i="0">
+                              <a:latin typeface="Cambria Math" panose="02040503050406030204" pitchFamily="18" charset="0"/>
+                            </a:rPr>
+                            <m:t>𝐛</m:t>
+                          </m:r>
+                        </m:e>
+                        <m:sub>
+                          <m:r>
+                            <a:rPr lang="zh-CN" altLang="en-US" sz="1600" b="1" i="0">
+                              <a:latin typeface="Cambria Math" panose="02040503050406030204" pitchFamily="18" charset="0"/>
+                            </a:rPr>
+                            <m:t>𝐢</m:t>
+                          </m:r>
+                        </m:sub>
+                      </m:sSub>
+                      <m:r>
+                        <a:rPr lang="zh-CN" altLang="en-US" sz="1600" i="0">
+                          <a:latin typeface="Cambria Math" panose="02040503050406030204" pitchFamily="18" charset="0"/>
+                        </a:rPr>
+                        <m:t>=</m:t>
+                      </m:r>
+                      <m:sSubSup>
+                        <m:sSubSupPr>
+                          <m:ctrlPr>
+                            <a:rPr lang="zh-CN" altLang="en-US" sz="1600" i="1">
+                              <a:latin typeface="Cambria Math" panose="02040503050406030204" pitchFamily="18" charset="0"/>
+                            </a:rPr>
+                          </m:ctrlPr>
+                        </m:sSubSupPr>
+                        <m:e>
+                          <m:d>
+                            <m:dPr>
+                              <m:begChr m:val="{"/>
+                              <m:endChr m:val="}"/>
+                              <m:ctrlPr>
+                                <a:rPr lang="zh-CN" altLang="en-US" sz="1600" i="1">
+                                  <a:latin typeface="Cambria Math" panose="02040503050406030204" pitchFamily="18" charset="0"/>
+                                </a:rPr>
+                              </m:ctrlPr>
+                            </m:dPr>
+                            <m:e>
+                              <m:sSub>
+                                <m:sSubPr>
+                                  <m:ctrlPr>
+                                    <a:rPr lang="en-US" altLang="zh-CN" sz="1600" b="0" i="1" smtClean="0">
+                                      <a:latin typeface="Cambria Math" panose="02040503050406030204" pitchFamily="18" charset="0"/>
+                                    </a:rPr>
+                                  </m:ctrlPr>
+                                </m:sSubPr>
+                                <m:e>
+                                  <m:r>
+                                    <a:rPr lang="en-US" altLang="zh-CN" sz="1600" b="0" i="1" smtClean="0">
+                                      <a:latin typeface="Cambria Math" panose="02040503050406030204" pitchFamily="18" charset="0"/>
+                                    </a:rPr>
+                                    <m:t>𝑏</m:t>
+                                  </m:r>
+                                </m:e>
+                                <m:sub>
+                                  <m:r>
+                                    <a:rPr lang="en-US" altLang="zh-CN" sz="1600" b="0" i="1" smtClean="0">
+                                      <a:latin typeface="Cambria Math" panose="02040503050406030204" pitchFamily="18" charset="0"/>
+                                    </a:rPr>
+                                    <m:t>𝑖</m:t>
+                                  </m:r>
+                                  <m:r>
+                                    <a:rPr lang="en-US" altLang="zh-CN" sz="1600" b="0" i="1" smtClean="0">
+                                      <a:latin typeface="Cambria Math" panose="02040503050406030204" pitchFamily="18" charset="0"/>
+                                    </a:rPr>
+                                    <m:t>,</m:t>
+                                  </m:r>
+                                  <m:r>
+                                    <a:rPr lang="en-US" altLang="zh-CN" sz="1600" b="0" i="1" smtClean="0">
+                                      <a:latin typeface="Cambria Math" panose="02040503050406030204" pitchFamily="18" charset="0"/>
+                                    </a:rPr>
+                                    <m:t>𝑗</m:t>
+                                  </m:r>
+                                </m:sub>
+                              </m:sSub>
+                            </m:e>
+                          </m:d>
+                        </m:e>
+                        <m:sub>
+                          <m:r>
+                            <a:rPr lang="zh-CN" altLang="en-US" sz="1600" i="1">
+                              <a:latin typeface="Cambria Math" panose="02040503050406030204" pitchFamily="18" charset="0"/>
+                            </a:rPr>
+                            <m:t>𝑗</m:t>
+                          </m:r>
+                          <m:r>
+                            <a:rPr lang="en-US" altLang="zh-CN" sz="1600" b="0" i="1" smtClean="0">
+                              <a:latin typeface="Cambria Math" panose="02040503050406030204" pitchFamily="18" charset="0"/>
+                            </a:rPr>
+                            <m:t>=1</m:t>
+                          </m:r>
+                        </m:sub>
+                        <m:sup>
+                          <m:r>
+                            <a:rPr lang="zh-CN" altLang="en-US" sz="1600" i="1">
+                              <a:latin typeface="Cambria Math" panose="02040503050406030204" pitchFamily="18" charset="0"/>
+                            </a:rPr>
+                            <m:t>𝑛</m:t>
+                          </m:r>
+                        </m:sup>
+                      </m:sSubSup>
+                    </m:oMath>
+                  </m:oMathPara>
+                </a14:m>
+                <a:endParaRPr lang="zh-CN" altLang="en-US" sz="1600" dirty="0"/>
+              </a:p>
+            </p:txBody>
+          </p:sp>
+        </mc:Choice>
+        <mc:Fallback>
+          <p:sp>
+            <p:nvSpPr>
+              <p:cNvPr id="9" name="文本框 8">
+                <a:extLst>
+                  <a:ext uri="{FF2B5EF4-FFF2-40B4-BE49-F238E27FC236}">
+                    <a16:creationId xmlns:a16="http://schemas.microsoft.com/office/drawing/2014/main" id="{FE40DABD-8549-4CD4-BB1F-40152A8FBA54}"/>
+                  </a:ext>
+                </a:extLst>
+              </p:cNvPr>
+              <p:cNvSpPr txBox="1">
+                <a:spLocks noRot="1" noChangeAspect="1" noMove="1" noResize="1" noEditPoints="1" noAdjustHandles="1" noChangeArrowheads="1" noChangeShapeType="1" noTextEdit="1"/>
+              </p:cNvSpPr>
+              <p:nvPr/>
+            </p:nvSpPr>
+            <p:spPr>
+              <a:xfrm>
+                <a:off x="7135355" y="6136801"/>
+                <a:ext cx="1222642" cy="372859"/>
+              </a:xfrm>
+              <a:prstGeom prst="rect">
+                <a:avLst/>
+              </a:prstGeom>
+              <a:blipFill>
+                <a:blip r:embed="rId8"/>
+                <a:stretch>
+                  <a:fillRect l="-2985" r="-498" b="-18033"/>
+                </a:stretch>
+              </a:blipFill>
+            </p:spPr>
+            <p:txBody>
+              <a:bodyPr/>
+              <a:lstStyle/>
+              <a:p>
+                <a:r>
+                  <a:rPr lang="zh-CN" altLang="en-US">
+                    <a:noFill/>
+                  </a:rPr>
+                  <a:t> </a:t>
+                </a:r>
+              </a:p>
+            </p:txBody>
+          </p:sp>
+        </mc:Fallback>
+      </mc:AlternateContent>
+      <mc:AlternateContent xmlns:mc="http://schemas.openxmlformats.org/markup-compatibility/2006">
+        <mc:Choice xmlns:a14="http://schemas.microsoft.com/office/drawing/2010/main" Requires="a14">
+          <p:sp>
+            <p:nvSpPr>
+              <p:cNvPr id="10" name="矩形 9">
+                <a:extLst>
+                  <a:ext uri="{FF2B5EF4-FFF2-40B4-BE49-F238E27FC236}">
+                    <a16:creationId xmlns:a16="http://schemas.microsoft.com/office/drawing/2014/main" id="{57A05E35-A765-4FCA-A7DF-CB88860EE750}"/>
+                  </a:ext>
+                </a:extLst>
+              </p:cNvPr>
+              <p:cNvSpPr/>
+              <p:nvPr/>
+            </p:nvSpPr>
+            <p:spPr>
+              <a:xfrm>
+                <a:off x="9149592" y="6011029"/>
+                <a:ext cx="1711622" cy="624402"/>
+              </a:xfrm>
+              <a:prstGeom prst="rect">
+                <a:avLst/>
+              </a:prstGeom>
+            </p:spPr>
+            <p:txBody>
+              <a:bodyPr wrap="none">
+                <a:spAutoFit/>
+              </a:bodyPr>
+              <a:lstStyle/>
+              <a:p>
+                <a14:m>
+                  <m:oMathPara xmlns:m="http://schemas.openxmlformats.org/officeDocument/2006/math">
+                    <m:oMathParaPr>
+                      <m:jc m:val="centerGroup"/>
+                    </m:oMathParaPr>
+                    <m:oMath xmlns:m="http://schemas.openxmlformats.org/officeDocument/2006/math">
+                      <m:sSub>
+                        <m:sSubPr>
+                          <m:ctrlPr>
+                            <a:rPr lang="en-US" altLang="zh-CN" sz="1600" i="1" smtClean="0">
+                              <a:latin typeface="Cambria Math" panose="02040503050406030204" pitchFamily="18" charset="0"/>
+                            </a:rPr>
+                          </m:ctrlPr>
+                        </m:sSubPr>
+                        <m:e>
+                          <m:r>
+                            <a:rPr lang="en-US" altLang="zh-CN" sz="1600" b="0" i="1" smtClean="0">
+                              <a:latin typeface="Cambria Math" panose="02040503050406030204" pitchFamily="18" charset="0"/>
+                            </a:rPr>
+                            <m:t>𝑠</m:t>
+                          </m:r>
+                        </m:e>
+                        <m:sub>
+                          <m:r>
+                            <a:rPr lang="en-US" altLang="zh-CN" sz="1600" i="1">
+                              <a:latin typeface="Cambria Math" panose="02040503050406030204" pitchFamily="18" charset="0"/>
+                            </a:rPr>
+                            <m:t>𝑖</m:t>
+                          </m:r>
+                          <m:r>
+                            <a:rPr lang="en-US" altLang="zh-CN" sz="1600" i="1">
+                              <a:latin typeface="Cambria Math" panose="02040503050406030204" pitchFamily="18" charset="0"/>
+                            </a:rPr>
+                            <m:t>,</m:t>
+                          </m:r>
+                          <m:r>
+                            <a:rPr lang="en-US" altLang="zh-CN" sz="1600" i="1">
+                              <a:latin typeface="Cambria Math" panose="02040503050406030204" pitchFamily="18" charset="0"/>
+                            </a:rPr>
+                            <m:t>𝑗</m:t>
+                          </m:r>
+                        </m:sub>
+                      </m:sSub>
+                      <m:r>
+                        <a:rPr lang="en-US" altLang="zh-CN" sz="1600" b="0" i="1" smtClean="0">
+                          <a:latin typeface="Cambria Math" panose="02040503050406030204" pitchFamily="18" charset="0"/>
+                        </a:rPr>
+                        <m:t>=0, </m:t>
+                      </m:r>
+                      <m:sSub>
+                        <m:sSubPr>
+                          <m:ctrlPr>
+                            <a:rPr lang="en-US" altLang="zh-CN" sz="1600" i="1" smtClean="0">
+                              <a:latin typeface="Cambria Math" panose="02040503050406030204" pitchFamily="18" charset="0"/>
+                            </a:rPr>
+                          </m:ctrlPr>
+                        </m:sSubPr>
+                        <m:e>
+                          <m:r>
+                            <a:rPr lang="en-US" altLang="zh-CN" sz="1600" i="1">
+                              <a:latin typeface="Cambria Math" panose="02040503050406030204" pitchFamily="18" charset="0"/>
+                            </a:rPr>
+                            <m:t>𝑏</m:t>
+                          </m:r>
+                        </m:e>
+                        <m:sub>
+                          <m:r>
+                            <a:rPr lang="en-US" altLang="zh-CN" sz="1600" i="1">
+                              <a:latin typeface="Cambria Math" panose="02040503050406030204" pitchFamily="18" charset="0"/>
+                            </a:rPr>
+                            <m:t>𝑖</m:t>
+                          </m:r>
+                          <m:r>
+                            <a:rPr lang="en-US" altLang="zh-CN" sz="1600" i="1">
+                              <a:latin typeface="Cambria Math" panose="02040503050406030204" pitchFamily="18" charset="0"/>
+                            </a:rPr>
+                            <m:t>,</m:t>
+                          </m:r>
+                          <m:r>
+                            <a:rPr lang="en-US" altLang="zh-CN" sz="1600" i="1">
+                              <a:latin typeface="Cambria Math" panose="02040503050406030204" pitchFamily="18" charset="0"/>
+                            </a:rPr>
+                            <m:t>𝑗</m:t>
+                          </m:r>
+                        </m:sub>
+                      </m:sSub>
+                      <m:r>
+                        <a:rPr lang="en-US" altLang="zh-CN" sz="1600" b="0" i="1" smtClean="0">
+                          <a:latin typeface="Cambria Math" panose="02040503050406030204" pitchFamily="18" charset="0"/>
+                        </a:rPr>
+                        <m:t>=1</m:t>
+                      </m:r>
+                    </m:oMath>
+                  </m:oMathPara>
+                </a14:m>
+                <a:endParaRPr lang="en-US" altLang="zh-CN" sz="1600" dirty="0"/>
+              </a:p>
+              <a:p>
+                <a14:m>
+                  <m:oMathPara xmlns:m="http://schemas.openxmlformats.org/officeDocument/2006/math">
+                    <m:oMathParaPr>
+                      <m:jc m:val="centerGroup"/>
+                    </m:oMathParaPr>
+                    <m:oMath xmlns:m="http://schemas.openxmlformats.org/officeDocument/2006/math">
+                      <m:r>
+                        <m:rPr>
+                          <m:sty m:val="p"/>
+                        </m:rPr>
+                        <a:rPr lang="en-US" altLang="zh-CN" sz="1600" b="0" i="0" smtClean="0">
+                          <a:latin typeface="Cambria Math" panose="02040503050406030204" pitchFamily="18" charset="0"/>
+                        </a:rPr>
+                        <m:t>else</m:t>
+                      </m:r>
+                      <m:r>
+                        <a:rPr lang="en-US" altLang="zh-CN" sz="1600" b="0" i="1" smtClean="0">
+                          <a:latin typeface="Cambria Math" panose="02040503050406030204" pitchFamily="18" charset="0"/>
+                        </a:rPr>
+                        <m:t> </m:t>
+                      </m:r>
+                      <m:sSub>
+                        <m:sSubPr>
+                          <m:ctrlPr>
+                            <a:rPr lang="en-US" altLang="zh-CN" sz="1600" i="1">
+                              <a:latin typeface="Cambria Math" panose="02040503050406030204" pitchFamily="18" charset="0"/>
+                            </a:rPr>
+                          </m:ctrlPr>
+                        </m:sSubPr>
+                        <m:e>
+                          <m:r>
+                            <a:rPr lang="en-US" altLang="zh-CN" sz="1600" i="1">
+                              <a:latin typeface="Cambria Math" panose="02040503050406030204" pitchFamily="18" charset="0"/>
+                            </a:rPr>
+                            <m:t>𝑏</m:t>
+                          </m:r>
+                        </m:e>
+                        <m:sub>
+                          <m:r>
+                            <a:rPr lang="en-US" altLang="zh-CN" sz="1600" i="1">
+                              <a:latin typeface="Cambria Math" panose="02040503050406030204" pitchFamily="18" charset="0"/>
+                            </a:rPr>
+                            <m:t>𝑖</m:t>
+                          </m:r>
+                          <m:r>
+                            <a:rPr lang="en-US" altLang="zh-CN" sz="1600" i="1">
+                              <a:latin typeface="Cambria Math" panose="02040503050406030204" pitchFamily="18" charset="0"/>
+                            </a:rPr>
+                            <m:t>,</m:t>
+                          </m:r>
+                          <m:r>
+                            <a:rPr lang="en-US" altLang="zh-CN" sz="1600" i="1">
+                              <a:latin typeface="Cambria Math" panose="02040503050406030204" pitchFamily="18" charset="0"/>
+                            </a:rPr>
+                            <m:t>𝑗</m:t>
+                          </m:r>
+                        </m:sub>
+                      </m:sSub>
+                      <m:r>
+                        <a:rPr lang="en-US" altLang="zh-CN" sz="1600" i="1">
+                          <a:latin typeface="Cambria Math" panose="02040503050406030204" pitchFamily="18" charset="0"/>
+                        </a:rPr>
+                        <m:t>=</m:t>
+                      </m:r>
+                      <m:r>
+                        <a:rPr lang="en-US" altLang="zh-CN" sz="1600" b="0" i="1" smtClean="0">
+                          <a:latin typeface="Cambria Math" panose="02040503050406030204" pitchFamily="18" charset="0"/>
+                        </a:rPr>
+                        <m:t>𝛽</m:t>
+                      </m:r>
+                      <m:r>
+                        <a:rPr lang="en-US" altLang="zh-CN" sz="1600" b="0" i="1" smtClean="0">
+                          <a:latin typeface="Cambria Math" panose="02040503050406030204" pitchFamily="18" charset="0"/>
+                        </a:rPr>
+                        <m:t>&gt;1</m:t>
+                      </m:r>
+                    </m:oMath>
+                  </m:oMathPara>
+                </a14:m>
+                <a:endParaRPr lang="zh-CN" altLang="en-US" sz="1600" dirty="0"/>
+              </a:p>
+            </p:txBody>
+          </p:sp>
+        </mc:Choice>
+        <mc:Fallback>
+          <p:sp>
+            <p:nvSpPr>
+              <p:cNvPr id="10" name="矩形 9">
+                <a:extLst>
+                  <a:ext uri="{FF2B5EF4-FFF2-40B4-BE49-F238E27FC236}">
+                    <a16:creationId xmlns:a16="http://schemas.microsoft.com/office/drawing/2014/main" id="{57A05E35-A765-4FCA-A7DF-CB88860EE750}"/>
+                  </a:ext>
+                </a:extLst>
+              </p:cNvPr>
+              <p:cNvSpPr>
+                <a:spLocks noRot="1" noChangeAspect="1" noMove="1" noResize="1" noEditPoints="1" noAdjustHandles="1" noChangeArrowheads="1" noChangeShapeType="1" noTextEdit="1"/>
+              </p:cNvSpPr>
+              <p:nvPr/>
+            </p:nvSpPr>
+            <p:spPr>
+              <a:xfrm>
+                <a:off x="9149592" y="6011029"/>
+                <a:ext cx="1711622" cy="624402"/>
+              </a:xfrm>
+              <a:prstGeom prst="rect">
+                <a:avLst/>
+              </a:prstGeom>
+              <a:blipFill>
+                <a:blip r:embed="rId9"/>
+                <a:stretch>
+                  <a:fillRect b="-3922"/>
+                </a:stretch>
+              </a:blipFill>
+            </p:spPr>
+            <p:txBody>
+              <a:bodyPr/>
+              <a:lstStyle/>
+              <a:p>
+                <a:r>
+                  <a:rPr lang="zh-CN" altLang="en-US">
+                    <a:noFill/>
+                  </a:rPr>
+                  <a:t> </a:t>
+                </a:r>
+              </a:p>
+            </p:txBody>
+          </p:sp>
+        </mc:Fallback>
+      </mc:AlternateContent>
+      <mc:AlternateContent xmlns:mc="http://schemas.openxmlformats.org/markup-compatibility/2006">
+        <mc:Choice xmlns:a14="http://schemas.microsoft.com/office/drawing/2010/main" Requires="a14">
+          <p:sp>
+            <p:nvSpPr>
+              <p:cNvPr id="11" name="矩形 10">
+                <a:extLst>
+                  <a:ext uri="{FF2B5EF4-FFF2-40B4-BE49-F238E27FC236}">
+                    <a16:creationId xmlns:a16="http://schemas.microsoft.com/office/drawing/2014/main" id="{4AA833AC-28D5-468B-BDA2-2BEFDF49DD61}"/>
+                  </a:ext>
+                </a:extLst>
+              </p:cNvPr>
+              <p:cNvSpPr/>
+              <p:nvPr/>
+            </p:nvSpPr>
+            <p:spPr>
+              <a:xfrm>
+                <a:off x="271824" y="4927712"/>
+                <a:ext cx="6257098" cy="381643"/>
+              </a:xfrm>
+              <a:prstGeom prst="rect">
+                <a:avLst/>
+              </a:prstGeom>
+            </p:spPr>
+            <p:txBody>
+              <a:bodyPr wrap="none">
+                <a:spAutoFit/>
+              </a:bodyPr>
+              <a:lstStyle/>
+              <a:p>
+                <a:r>
+                  <a:rPr lang="en-US" altLang="zh-CN" b="1" dirty="0">
+                    <a:latin typeface="Calibri" panose="020F0502020204030204" pitchFamily="34" charset="0"/>
+                    <a:cs typeface="Calibri" panose="020F0502020204030204" pitchFamily="34" charset="0"/>
+                  </a:rPr>
+                  <a:t>Network embedding: </a:t>
+                </a:r>
+                <a:r>
+                  <a:rPr lang="en-US" altLang="zh-CN" dirty="0">
+                    <a:latin typeface="Calibri" panose="020F0502020204030204" pitchFamily="34" charset="0"/>
+                    <a:cs typeface="Calibri" panose="020F0502020204030204" pitchFamily="34" charset="0"/>
+                  </a:rPr>
+                  <a:t>learn a mapping function </a:t>
+                </a:r>
+                <a14:m>
+                  <m:oMath xmlns:m="http://schemas.openxmlformats.org/officeDocument/2006/math">
+                    <m:r>
+                      <a:rPr lang="en-US" altLang="zh-CN" i="1" smtClean="0">
+                        <a:latin typeface="Cambria Math" panose="02040503050406030204" pitchFamily="18" charset="0"/>
+                      </a:rPr>
+                      <m:t>𝑓</m:t>
+                    </m:r>
+                    <m:r>
+                      <a:rPr lang="en-US" altLang="zh-CN" i="0" smtClean="0">
+                        <a:latin typeface="Cambria Math" panose="02040503050406030204" pitchFamily="18" charset="0"/>
+                      </a:rPr>
+                      <m:t>:</m:t>
+                    </m:r>
+                    <m:sSub>
+                      <m:sSubPr>
+                        <m:ctrlPr>
+                          <a:rPr lang="en-US" altLang="zh-CN" i="1" smtClean="0">
+                            <a:latin typeface="Cambria Math" panose="02040503050406030204" pitchFamily="18" charset="0"/>
+                          </a:rPr>
+                        </m:ctrlPr>
+                      </m:sSubPr>
+                      <m:e>
+                        <m:r>
+                          <a:rPr lang="en-US" altLang="zh-CN" i="1" smtClean="0">
+                            <a:latin typeface="Cambria Math" panose="02040503050406030204" pitchFamily="18" charset="0"/>
+                          </a:rPr>
+                          <m:t>𝑣</m:t>
+                        </m:r>
+                      </m:e>
+                      <m:sub>
+                        <m:r>
+                          <a:rPr lang="en-US" altLang="zh-CN" i="1" smtClean="0">
+                            <a:latin typeface="Cambria Math" panose="02040503050406030204" pitchFamily="18" charset="0"/>
+                          </a:rPr>
+                          <m:t>𝑖</m:t>
+                        </m:r>
+                      </m:sub>
+                    </m:sSub>
+                    <m:r>
+                      <a:rPr lang="en-US" altLang="zh-CN" i="0" smtClean="0">
+                        <a:latin typeface="Cambria Math" panose="02040503050406030204" pitchFamily="18" charset="0"/>
+                      </a:rPr>
+                      <m:t>→</m:t>
+                    </m:r>
+                    <m:sSub>
+                      <m:sSubPr>
+                        <m:ctrlPr>
+                          <a:rPr lang="en-US" altLang="zh-CN" b="1" smtClean="0">
+                            <a:latin typeface="Cambria Math" panose="02040503050406030204" pitchFamily="18" charset="0"/>
+                          </a:rPr>
+                        </m:ctrlPr>
+                      </m:sSubPr>
+                      <m:e>
+                        <m:r>
+                          <a:rPr lang="en-US" altLang="zh-CN" b="1" i="0" smtClean="0">
+                            <a:latin typeface="Cambria Math" panose="02040503050406030204" pitchFamily="18" charset="0"/>
+                          </a:rPr>
+                          <m:t>𝐲</m:t>
+                        </m:r>
+                      </m:e>
+                      <m:sub>
+                        <m:r>
+                          <a:rPr lang="en-US" altLang="zh-CN" b="1" i="0" smtClean="0">
+                            <a:latin typeface="Cambria Math" panose="02040503050406030204" pitchFamily="18" charset="0"/>
+                          </a:rPr>
+                          <m:t>𝐢</m:t>
+                        </m:r>
+                      </m:sub>
+                    </m:sSub>
+                    <m:r>
+                      <a:rPr lang="en-US" altLang="zh-CN" i="0" smtClean="0">
+                        <a:latin typeface="Cambria Math" panose="02040503050406030204" pitchFamily="18" charset="0"/>
+                      </a:rPr>
+                      <m:t>∈</m:t>
+                    </m:r>
+                    <m:sSup>
+                      <m:sSupPr>
+                        <m:ctrlPr>
+                          <a:rPr lang="en-US" altLang="zh-CN" b="0" i="0" smtClean="0">
+                            <a:latin typeface="Cambria Math" panose="02040503050406030204" pitchFamily="18" charset="0"/>
+                          </a:rPr>
+                        </m:ctrlPr>
+                      </m:sSupPr>
+                      <m:e>
+                        <m:r>
+                          <m:rPr>
+                            <m:sty m:val="p"/>
+                          </m:rPr>
+                          <a:rPr lang="en-US" altLang="zh-CN" b="0" i="0" smtClean="0">
+                            <a:latin typeface="Cambria Math" panose="02040503050406030204" pitchFamily="18" charset="0"/>
+                          </a:rPr>
+                          <m:t>R</m:t>
+                        </m:r>
+                      </m:e>
+                      <m:sup>
+                        <m:r>
+                          <m:rPr>
+                            <m:sty m:val="p"/>
+                          </m:rPr>
+                          <a:rPr lang="en-US" altLang="zh-CN" b="0" i="0" smtClean="0">
+                            <a:latin typeface="Cambria Math" panose="02040503050406030204" pitchFamily="18" charset="0"/>
+                          </a:rPr>
+                          <m:t>d</m:t>
+                        </m:r>
+                      </m:sup>
+                    </m:sSup>
+                  </m:oMath>
+                </a14:m>
+                <a:endParaRPr lang="zh-CN" altLang="en-US" dirty="0"/>
+              </a:p>
+            </p:txBody>
+          </p:sp>
+        </mc:Choice>
+        <mc:Fallback>
+          <p:sp>
+            <p:nvSpPr>
+              <p:cNvPr id="11" name="矩形 10">
+                <a:extLst>
+                  <a:ext uri="{FF2B5EF4-FFF2-40B4-BE49-F238E27FC236}">
+                    <a16:creationId xmlns:a16="http://schemas.microsoft.com/office/drawing/2014/main" id="{4AA833AC-28D5-468B-BDA2-2BEFDF49DD61}"/>
+                  </a:ext>
+                </a:extLst>
+              </p:cNvPr>
+              <p:cNvSpPr>
+                <a:spLocks noRot="1" noChangeAspect="1" noMove="1" noResize="1" noEditPoints="1" noAdjustHandles="1" noChangeArrowheads="1" noChangeShapeType="1" noTextEdit="1"/>
+              </p:cNvSpPr>
+              <p:nvPr/>
+            </p:nvSpPr>
+            <p:spPr>
+              <a:xfrm>
+                <a:off x="271824" y="4927712"/>
+                <a:ext cx="6257098" cy="381643"/>
+              </a:xfrm>
+              <a:prstGeom prst="rect">
+                <a:avLst/>
+              </a:prstGeom>
+              <a:blipFill>
+                <a:blip r:embed="rId10"/>
+                <a:stretch>
+                  <a:fillRect l="-877" t="-4762" b="-23810"/>
+                </a:stretch>
+              </a:blipFill>
+            </p:spPr>
+            <p:txBody>
+              <a:bodyPr/>
+              <a:lstStyle/>
+              <a:p>
+                <a:r>
+                  <a:rPr lang="zh-CN" altLang="en-US">
+                    <a:noFill/>
+                  </a:rPr>
+                  <a:t> </a:t>
+                </a:r>
+              </a:p>
+            </p:txBody>
+          </p:sp>
+        </mc:Fallback>
+      </mc:AlternateContent>
+    </p:spTree>
+    <p:extLst>
+      <p:ext uri="{BB962C8B-B14F-4D97-AF65-F5344CB8AC3E}">
+        <p14:creationId xmlns:p14="http://schemas.microsoft.com/office/powerpoint/2010/main" val="3649513400"/>
+      </p:ext>
+    </p:extLst>
+  </p:cSld>
+  <p:clrMapOvr>
+    <a:masterClrMapping/>
+  </p:clrMapOvr>
+</p:sld>
+</file>
+
+<file path=ppt/slides/slide4.xml><?xml version="1.0" encoding="utf-8"?>
+<p:sld xmlns:a="http://schemas.openxmlformats.org/drawingml/2006/main" xmlns:r="http://schemas.openxmlformats.org/officeDocument/2006/relationships" xmlns:p="http://schemas.openxmlformats.org/presentationml/2006/main">
+  <p:cSld>
+    <p:spTree>
+      <p:nvGrpSpPr>
+        <p:cNvPr id="1" name=""/>
+        <p:cNvGrpSpPr/>
+        <p:nvPr/>
+      </p:nvGrpSpPr>
+      <p:grpSpPr>
+        <a:xfrm>
+          <a:off x="0" y="0"/>
+          <a:ext cx="0" cy="0"/>
+          <a:chOff x="0" y="0"/>
+          <a:chExt cx="0" cy="0"/>
+        </a:xfrm>
+      </p:grpSpPr>
+      <p:pic>
+        <p:nvPicPr>
+          <p:cNvPr id="5" name="图片 4">
+            <a:extLst>
+              <a:ext uri="{FF2B5EF4-FFF2-40B4-BE49-F238E27FC236}">
+                <a16:creationId xmlns:a16="http://schemas.microsoft.com/office/drawing/2014/main" id="{75D13E29-20EE-4879-A599-F555D10979B1}"/>
+              </a:ext>
+            </a:extLst>
+          </p:cNvPr>
+          <p:cNvPicPr>
+            <a:picLocks noChangeAspect="1"/>
+          </p:cNvPicPr>
+          <p:nvPr/>
+        </p:nvPicPr>
+        <p:blipFill>
+          <a:blip r:embed="rId3"/>
+          <a:stretch>
+            <a:fillRect/>
+          </a:stretch>
+        </p:blipFill>
+        <p:spPr>
+          <a:xfrm>
+            <a:off x="303348" y="558687"/>
+            <a:ext cx="5861351" cy="4369025"/>
+          </a:xfrm>
+          <a:prstGeom prst="rect">
+            <a:avLst/>
+          </a:prstGeom>
+        </p:spPr>
+      </p:pic>
+      <p:sp>
+        <p:nvSpPr>
+          <p:cNvPr id="3" name="矩形 2">
+            <a:extLst>
+              <a:ext uri="{FF2B5EF4-FFF2-40B4-BE49-F238E27FC236}">
+                <a16:creationId xmlns:a16="http://schemas.microsoft.com/office/drawing/2014/main" id="{C1393A89-A3BB-4228-A74C-E624C836A54D}"/>
+              </a:ext>
+            </a:extLst>
+          </p:cNvPr>
+          <p:cNvSpPr/>
+          <p:nvPr/>
+        </p:nvSpPr>
+        <p:spPr>
+          <a:xfrm>
+            <a:off x="122373" y="5216883"/>
+            <a:ext cx="6818983" cy="646331"/>
+          </a:xfrm>
+          <a:prstGeom prst="rect">
+            <a:avLst/>
+          </a:prstGeom>
+        </p:spPr>
+        <p:txBody>
+          <a:bodyPr wrap="none">
+            <a:spAutoFit/>
+          </a:bodyPr>
+          <a:lstStyle/>
+          <a:p>
+            <a:r>
+              <a:rPr lang="en-US" altLang="zh-CN" b="1" dirty="0">
+                <a:latin typeface="Calibri" panose="020F0502020204030204" pitchFamily="34" charset="0"/>
+                <a:cs typeface="Calibri" panose="020F0502020204030204" pitchFamily="34" charset="0"/>
+              </a:rPr>
+              <a:t>Supervised component</a:t>
+            </a:r>
+          </a:p>
+          <a:p>
+            <a:r>
+              <a:rPr lang="en-US" altLang="zh-CN" dirty="0">
+                <a:latin typeface="Calibri" panose="020F0502020204030204" pitchFamily="34" charset="0"/>
+                <a:cs typeface="Calibri" panose="020F0502020204030204" pitchFamily="34" charset="0"/>
+              </a:rPr>
+              <a:t>Constrain the similarity of the latent representation of paired vertices.</a:t>
+            </a:r>
+            <a:endParaRPr lang="zh-CN" altLang="en-US" dirty="0">
+              <a:latin typeface="Calibri" panose="020F0502020204030204" pitchFamily="34" charset="0"/>
+              <a:cs typeface="Calibri" panose="020F0502020204030204" pitchFamily="34" charset="0"/>
+            </a:endParaRPr>
+          </a:p>
+        </p:txBody>
+      </p:sp>
+      <p:pic>
+        <p:nvPicPr>
+          <p:cNvPr id="14" name="图片 13">
+            <a:extLst>
+              <a:ext uri="{FF2B5EF4-FFF2-40B4-BE49-F238E27FC236}">
+                <a16:creationId xmlns:a16="http://schemas.microsoft.com/office/drawing/2014/main" id="{06199513-3508-4BC5-822B-C854CED8AEA5}"/>
+              </a:ext>
+            </a:extLst>
+          </p:cNvPr>
+          <p:cNvPicPr>
+            <a:picLocks noChangeAspect="1"/>
+          </p:cNvPicPr>
+          <p:nvPr/>
+        </p:nvPicPr>
+        <p:blipFill>
+          <a:blip r:embed="rId4"/>
+          <a:stretch>
+            <a:fillRect/>
+          </a:stretch>
+        </p:blipFill>
+        <p:spPr>
+          <a:xfrm>
+            <a:off x="6287238" y="2598690"/>
+            <a:ext cx="5904762" cy="1161905"/>
+          </a:xfrm>
+          <a:prstGeom prst="rect">
+            <a:avLst/>
+          </a:prstGeom>
+        </p:spPr>
+      </p:pic>
+      <p:pic>
+        <p:nvPicPr>
+          <p:cNvPr id="16" name="图片 15">
+            <a:extLst>
+              <a:ext uri="{FF2B5EF4-FFF2-40B4-BE49-F238E27FC236}">
+                <a16:creationId xmlns:a16="http://schemas.microsoft.com/office/drawing/2014/main" id="{5043EB85-F937-4AC0-867D-D30E0D7F37F6}"/>
+              </a:ext>
+            </a:extLst>
+          </p:cNvPr>
+          <p:cNvPicPr>
+            <a:picLocks noChangeAspect="1"/>
+          </p:cNvPicPr>
+          <p:nvPr/>
+        </p:nvPicPr>
+        <p:blipFill>
+          <a:blip r:embed="rId5"/>
+          <a:stretch>
+            <a:fillRect/>
+          </a:stretch>
+        </p:blipFill>
+        <p:spPr>
+          <a:xfrm>
+            <a:off x="6496533" y="4146760"/>
+            <a:ext cx="3866667" cy="780952"/>
+          </a:xfrm>
+          <a:prstGeom prst="rect">
+            <a:avLst/>
+          </a:prstGeom>
+        </p:spPr>
+      </p:pic>
+      <p:pic>
+        <p:nvPicPr>
+          <p:cNvPr id="18" name="图片 17">
+            <a:extLst>
+              <a:ext uri="{FF2B5EF4-FFF2-40B4-BE49-F238E27FC236}">
+                <a16:creationId xmlns:a16="http://schemas.microsoft.com/office/drawing/2014/main" id="{21BD770F-3B91-4CEB-8BE5-95DA096846E6}"/>
+              </a:ext>
+            </a:extLst>
+          </p:cNvPr>
+          <p:cNvPicPr>
+            <a:picLocks noChangeAspect="1"/>
+          </p:cNvPicPr>
+          <p:nvPr/>
+        </p:nvPicPr>
+        <p:blipFill>
+          <a:blip r:embed="rId6"/>
+          <a:stretch>
+            <a:fillRect/>
+          </a:stretch>
+        </p:blipFill>
+        <p:spPr>
+          <a:xfrm>
+            <a:off x="6287238" y="679192"/>
+            <a:ext cx="3695238" cy="1533333"/>
+          </a:xfrm>
+          <a:prstGeom prst="rect">
+            <a:avLst/>
+          </a:prstGeom>
+        </p:spPr>
+      </p:pic>
+      <p:pic>
+        <p:nvPicPr>
+          <p:cNvPr id="19" name="图片 18">
+            <a:extLst>
+              <a:ext uri="{FF2B5EF4-FFF2-40B4-BE49-F238E27FC236}">
+                <a16:creationId xmlns:a16="http://schemas.microsoft.com/office/drawing/2014/main" id="{BA2201B7-E981-4ADE-BCFB-A8B885015F6B}"/>
+              </a:ext>
+            </a:extLst>
+          </p:cNvPr>
+          <p:cNvPicPr>
+            <a:picLocks noChangeAspect="1"/>
+          </p:cNvPicPr>
+          <p:nvPr/>
+        </p:nvPicPr>
+        <p:blipFill>
+          <a:blip r:embed="rId7"/>
+          <a:stretch>
+            <a:fillRect/>
+          </a:stretch>
+        </p:blipFill>
+        <p:spPr>
+          <a:xfrm>
+            <a:off x="6496533" y="5891789"/>
+            <a:ext cx="5419048" cy="285714"/>
           </a:xfrm>
           <a:prstGeom prst="rect">
             <a:avLst/>
@@ -4002,7 +6242,1051 @@
     </p:spTree>
     <p:extLst>
       <p:ext uri="{BB962C8B-B14F-4D97-AF65-F5344CB8AC3E}">
-        <p14:creationId xmlns:p14="http://schemas.microsoft.com/office/powerpoint/2010/main" val="3649513400"/>
+        <p14:creationId xmlns:p14="http://schemas.microsoft.com/office/powerpoint/2010/main" val="3380421187"/>
+      </p:ext>
+    </p:extLst>
+  </p:cSld>
+  <p:clrMapOvr>
+    <a:masterClrMapping/>
+  </p:clrMapOvr>
+</p:sld>
+</file>
+
+<file path=ppt/slides/slide5.xml><?xml version="1.0" encoding="utf-8"?>
+<p:sld xmlns:a="http://schemas.openxmlformats.org/drawingml/2006/main" xmlns:r="http://schemas.openxmlformats.org/officeDocument/2006/relationships" xmlns:p="http://schemas.openxmlformats.org/presentationml/2006/main">
+  <p:cSld>
+    <p:spTree>
+      <p:nvGrpSpPr>
+        <p:cNvPr id="1" name=""/>
+        <p:cNvGrpSpPr/>
+        <p:nvPr/>
+      </p:nvGrpSpPr>
+      <p:grpSpPr>
+        <a:xfrm>
+          <a:off x="0" y="0"/>
+          <a:ext cx="0" cy="0"/>
+          <a:chOff x="0" y="0"/>
+          <a:chExt cx="0" cy="0"/>
+        </a:xfrm>
+      </p:grpSpPr>
+      <p:sp>
+        <p:nvSpPr>
+          <p:cNvPr id="9" name="矩形 8">
+            <a:extLst>
+              <a:ext uri="{FF2B5EF4-FFF2-40B4-BE49-F238E27FC236}">
+                <a16:creationId xmlns:a16="http://schemas.microsoft.com/office/drawing/2014/main" id="{D4AB9EA0-F65F-4A2A-A085-8F4413FD1CDF}"/>
+              </a:ext>
+            </a:extLst>
+          </p:cNvPr>
+          <p:cNvSpPr/>
+          <p:nvPr/>
+        </p:nvSpPr>
+        <p:spPr>
+          <a:xfrm>
+            <a:off x="123825" y="401510"/>
+            <a:ext cx="3575787" cy="584775"/>
+          </a:xfrm>
+          <a:prstGeom prst="rect">
+            <a:avLst/>
+          </a:prstGeom>
+        </p:spPr>
+        <p:txBody>
+          <a:bodyPr wrap="none">
+            <a:spAutoFit/>
+          </a:bodyPr>
+          <a:lstStyle/>
+          <a:p>
+            <a:r>
+              <a:rPr lang="en-US" altLang="zh-CN" sz="3200" b="1" dirty="0">
+                <a:solidFill>
+                  <a:prstClr val="black"/>
+                </a:solidFill>
+                <a:latin typeface="Calibri" panose="020F0502020204030204" pitchFamily="34" charset="0"/>
+                <a:cs typeface="Calibri" panose="020F0502020204030204" pitchFamily="34" charset="0"/>
+              </a:rPr>
+              <a:t>Baseline Algorithms</a:t>
+            </a:r>
+            <a:endParaRPr lang="zh-CN" altLang="en-US" sz="1600" dirty="0"/>
+          </a:p>
+        </p:txBody>
+      </p:sp>
+      <p:pic>
+        <p:nvPicPr>
+          <p:cNvPr id="12" name="图片 11">
+            <a:extLst>
+              <a:ext uri="{FF2B5EF4-FFF2-40B4-BE49-F238E27FC236}">
+                <a16:creationId xmlns:a16="http://schemas.microsoft.com/office/drawing/2014/main" id="{B20A543C-1C77-417D-9357-43858E05A6A7}"/>
+              </a:ext>
+            </a:extLst>
+          </p:cNvPr>
+          <p:cNvPicPr>
+            <a:picLocks noChangeAspect="1"/>
+          </p:cNvPicPr>
+          <p:nvPr/>
+        </p:nvPicPr>
+        <p:blipFill>
+          <a:blip r:embed="rId2"/>
+          <a:stretch>
+            <a:fillRect/>
+          </a:stretch>
+        </p:blipFill>
+        <p:spPr>
+          <a:xfrm>
+            <a:off x="245205" y="1281257"/>
+            <a:ext cx="5683594" cy="4543136"/>
+          </a:xfrm>
+          <a:prstGeom prst="rect">
+            <a:avLst/>
+          </a:prstGeom>
+        </p:spPr>
+      </p:pic>
+      <p:sp>
+        <p:nvSpPr>
+          <p:cNvPr id="13" name="矩形 12">
+            <a:extLst>
+              <a:ext uri="{FF2B5EF4-FFF2-40B4-BE49-F238E27FC236}">
+                <a16:creationId xmlns:a16="http://schemas.microsoft.com/office/drawing/2014/main" id="{7374B4CC-8024-4ED7-9EBA-B64CDA923079}"/>
+              </a:ext>
+            </a:extLst>
+          </p:cNvPr>
+          <p:cNvSpPr/>
+          <p:nvPr/>
+        </p:nvSpPr>
+        <p:spPr>
+          <a:xfrm>
+            <a:off x="463918" y="1209675"/>
+            <a:ext cx="1447800" cy="409575"/>
+          </a:xfrm>
+          <a:prstGeom prst="rect">
+            <a:avLst/>
+          </a:prstGeom>
+          <a:noFill/>
+          <a:ln w="19050">
+            <a:solidFill>
+              <a:srgbClr val="C00000"/>
+            </a:solidFill>
+          </a:ln>
+        </p:spPr>
+        <p:style>
+          <a:lnRef idx="2">
+            <a:schemeClr val="accent1">
+              <a:shade val="50000"/>
+            </a:schemeClr>
+          </a:lnRef>
+          <a:fillRef idx="1">
+            <a:schemeClr val="accent1"/>
+          </a:fillRef>
+          <a:effectRef idx="0">
+            <a:schemeClr val="accent1"/>
+          </a:effectRef>
+          <a:fontRef idx="minor">
+            <a:schemeClr val="lt1"/>
+          </a:fontRef>
+        </p:style>
+        <p:txBody>
+          <a:bodyPr rtlCol="0" anchor="ctr"/>
+          <a:lstStyle/>
+          <a:p>
+            <a:pPr algn="ctr"/>
+            <a:endParaRPr lang="zh-CN" altLang="en-US"/>
+          </a:p>
+        </p:txBody>
+      </p:sp>
+      <p:sp>
+        <p:nvSpPr>
+          <p:cNvPr id="14" name="矩形 13">
+            <a:extLst>
+              <a:ext uri="{FF2B5EF4-FFF2-40B4-BE49-F238E27FC236}">
+                <a16:creationId xmlns:a16="http://schemas.microsoft.com/office/drawing/2014/main" id="{26B8E872-81BF-4CCC-B4E7-F61C18E4DA6C}"/>
+              </a:ext>
+            </a:extLst>
+          </p:cNvPr>
+          <p:cNvSpPr/>
+          <p:nvPr/>
+        </p:nvSpPr>
+        <p:spPr>
+          <a:xfrm>
+            <a:off x="463918" y="1876425"/>
+            <a:ext cx="1028700" cy="409575"/>
+          </a:xfrm>
+          <a:prstGeom prst="rect">
+            <a:avLst/>
+          </a:prstGeom>
+          <a:noFill/>
+          <a:ln w="19050">
+            <a:solidFill>
+              <a:srgbClr val="C00000"/>
+            </a:solidFill>
+          </a:ln>
+        </p:spPr>
+        <p:style>
+          <a:lnRef idx="2">
+            <a:schemeClr val="accent1">
+              <a:shade val="50000"/>
+            </a:schemeClr>
+          </a:lnRef>
+          <a:fillRef idx="1">
+            <a:schemeClr val="accent1"/>
+          </a:fillRef>
+          <a:effectRef idx="0">
+            <a:schemeClr val="accent1"/>
+          </a:effectRef>
+          <a:fontRef idx="minor">
+            <a:schemeClr val="lt1"/>
+          </a:fontRef>
+        </p:style>
+        <p:txBody>
+          <a:bodyPr rtlCol="0" anchor="ctr"/>
+          <a:lstStyle/>
+          <a:p>
+            <a:pPr algn="ctr"/>
+            <a:endParaRPr lang="zh-CN" altLang="en-US"/>
+          </a:p>
+        </p:txBody>
+      </p:sp>
+    </p:spTree>
+    <p:extLst>
+      <p:ext uri="{BB962C8B-B14F-4D97-AF65-F5344CB8AC3E}">
+        <p14:creationId xmlns:p14="http://schemas.microsoft.com/office/powerpoint/2010/main" val="1323353939"/>
+      </p:ext>
+    </p:extLst>
+  </p:cSld>
+  <p:clrMapOvr>
+    <a:masterClrMapping/>
+  </p:clrMapOvr>
+</p:sld>
+</file>
+
+<file path=ppt/slides/slide6.xml><?xml version="1.0" encoding="utf-8"?>
+<p:sld xmlns:a="http://schemas.openxmlformats.org/drawingml/2006/main" xmlns:r="http://schemas.openxmlformats.org/officeDocument/2006/relationships" xmlns:p="http://schemas.openxmlformats.org/presentationml/2006/main">
+  <p:cSld>
+    <p:spTree>
+      <p:nvGrpSpPr>
+        <p:cNvPr id="1" name=""/>
+        <p:cNvGrpSpPr/>
+        <p:nvPr/>
+      </p:nvGrpSpPr>
+      <p:grpSpPr>
+        <a:xfrm>
+          <a:off x="0" y="0"/>
+          <a:ext cx="0" cy="0"/>
+          <a:chOff x="0" y="0"/>
+          <a:chExt cx="0" cy="0"/>
+        </a:xfrm>
+      </p:grpSpPr>
+      <p:sp>
+        <p:nvSpPr>
+          <p:cNvPr id="4" name="矩形 3">
+            <a:extLst>
+              <a:ext uri="{FF2B5EF4-FFF2-40B4-BE49-F238E27FC236}">
+                <a16:creationId xmlns:a16="http://schemas.microsoft.com/office/drawing/2014/main" id="{45CF230E-138D-459C-ACCE-AD0A1E0D4162}"/>
+              </a:ext>
+            </a:extLst>
+          </p:cNvPr>
+          <p:cNvSpPr/>
+          <p:nvPr/>
+        </p:nvSpPr>
+        <p:spPr>
+          <a:xfrm>
+            <a:off x="222533" y="1471657"/>
+            <a:ext cx="4063717" cy="1569660"/>
+          </a:xfrm>
+          <a:prstGeom prst="rect">
+            <a:avLst/>
+          </a:prstGeom>
+        </p:spPr>
+        <p:txBody>
+          <a:bodyPr wrap="square">
+            <a:spAutoFit/>
+          </a:bodyPr>
+          <a:lstStyle/>
+          <a:p>
+            <a:pPr marL="285750" indent="-285750">
+              <a:buFont typeface="Arial" panose="020B0604020202020204" pitchFamily="34" charset="0"/>
+              <a:buChar char="•"/>
+            </a:pPr>
+            <a:r>
+              <a:rPr lang="en-US" altLang="zh-CN" sz="2400" b="1" dirty="0">
+                <a:latin typeface="Calibri" panose="020F0502020204030204" pitchFamily="34" charset="0"/>
+                <a:cs typeface="Calibri" panose="020F0502020204030204" pitchFamily="34" charset="0"/>
+              </a:rPr>
+              <a:t>Network Reconstruction </a:t>
+            </a:r>
+          </a:p>
+          <a:p>
+            <a:pPr marL="285750" indent="-285750">
+              <a:buFont typeface="Arial" panose="020B0604020202020204" pitchFamily="34" charset="0"/>
+              <a:buChar char="•"/>
+            </a:pPr>
+            <a:r>
+              <a:rPr lang="en-US" altLang="zh-CN" sz="2400" dirty="0">
+                <a:latin typeface="Calibri" panose="020F0502020204030204" pitchFamily="34" charset="0"/>
+                <a:cs typeface="Calibri" panose="020F0502020204030204" pitchFamily="34" charset="0"/>
+              </a:rPr>
+              <a:t>Multi-label Classification</a:t>
+            </a:r>
+          </a:p>
+          <a:p>
+            <a:pPr marL="285750" indent="-285750">
+              <a:buFont typeface="Arial" panose="020B0604020202020204" pitchFamily="34" charset="0"/>
+              <a:buChar char="•"/>
+            </a:pPr>
+            <a:r>
+              <a:rPr lang="en-US" altLang="zh-CN" sz="2400" dirty="0">
+                <a:latin typeface="Calibri" panose="020F0502020204030204" pitchFamily="34" charset="0"/>
+                <a:cs typeface="Calibri" panose="020F0502020204030204" pitchFamily="34" charset="0"/>
+              </a:rPr>
+              <a:t>Link Prediction</a:t>
+            </a:r>
+          </a:p>
+          <a:p>
+            <a:pPr marL="285750" indent="-285750">
+              <a:buFont typeface="Arial" panose="020B0604020202020204" pitchFamily="34" charset="0"/>
+              <a:buChar char="•"/>
+            </a:pPr>
+            <a:r>
+              <a:rPr lang="en-US" altLang="zh-CN" sz="2400" dirty="0">
+                <a:solidFill>
+                  <a:prstClr val="black"/>
+                </a:solidFill>
+                <a:latin typeface="Calibri" panose="020F0502020204030204" pitchFamily="34" charset="0"/>
+                <a:cs typeface="Calibri" panose="020F0502020204030204" pitchFamily="34" charset="0"/>
+              </a:rPr>
+              <a:t>Visualization</a:t>
+            </a:r>
+            <a:endParaRPr lang="en-US" altLang="zh-CN" sz="2400" dirty="0">
+              <a:latin typeface="Calibri" panose="020F0502020204030204" pitchFamily="34" charset="0"/>
+              <a:cs typeface="Calibri" panose="020F0502020204030204" pitchFamily="34" charset="0"/>
+            </a:endParaRPr>
+          </a:p>
+        </p:txBody>
+      </p:sp>
+      <p:sp>
+        <p:nvSpPr>
+          <p:cNvPr id="5" name="矩形 4">
+            <a:extLst>
+              <a:ext uri="{FF2B5EF4-FFF2-40B4-BE49-F238E27FC236}">
+                <a16:creationId xmlns:a16="http://schemas.microsoft.com/office/drawing/2014/main" id="{AC72818E-56A4-4C68-85AB-1763EA56F7D2}"/>
+              </a:ext>
+            </a:extLst>
+          </p:cNvPr>
+          <p:cNvSpPr/>
+          <p:nvPr/>
+        </p:nvSpPr>
+        <p:spPr>
+          <a:xfrm>
+            <a:off x="123825" y="401510"/>
+            <a:ext cx="2146165" cy="584775"/>
+          </a:xfrm>
+          <a:prstGeom prst="rect">
+            <a:avLst/>
+          </a:prstGeom>
+        </p:spPr>
+        <p:txBody>
+          <a:bodyPr wrap="none">
+            <a:spAutoFit/>
+          </a:bodyPr>
+          <a:lstStyle/>
+          <a:p>
+            <a:r>
+              <a:rPr lang="en-US" altLang="zh-CN" sz="3200" b="1" dirty="0">
+                <a:solidFill>
+                  <a:prstClr val="black"/>
+                </a:solidFill>
+                <a:latin typeface="Calibri" panose="020F0502020204030204" pitchFamily="34" charset="0"/>
+                <a:cs typeface="Calibri" panose="020F0502020204030204" pitchFamily="34" charset="0"/>
+              </a:rPr>
+              <a:t>Experiment</a:t>
+            </a:r>
+            <a:endParaRPr lang="zh-CN" altLang="en-US" sz="1600" dirty="0"/>
+          </a:p>
+        </p:txBody>
+      </p:sp>
+      <p:pic>
+        <p:nvPicPr>
+          <p:cNvPr id="6" name="图片 5">
+            <a:extLst>
+              <a:ext uri="{FF2B5EF4-FFF2-40B4-BE49-F238E27FC236}">
+                <a16:creationId xmlns:a16="http://schemas.microsoft.com/office/drawing/2014/main" id="{72F8D6BB-7BCF-4943-A351-E3F09F6FB03B}"/>
+              </a:ext>
+            </a:extLst>
+          </p:cNvPr>
+          <p:cNvPicPr>
+            <a:picLocks noChangeAspect="1"/>
+          </p:cNvPicPr>
+          <p:nvPr/>
+        </p:nvPicPr>
+        <p:blipFill>
+          <a:blip r:embed="rId2"/>
+          <a:stretch>
+            <a:fillRect/>
+          </a:stretch>
+        </p:blipFill>
+        <p:spPr>
+          <a:xfrm>
+            <a:off x="3934313" y="381523"/>
+            <a:ext cx="7809524" cy="1209524"/>
+          </a:xfrm>
+          <a:prstGeom prst="rect">
+            <a:avLst/>
+          </a:prstGeom>
+        </p:spPr>
+      </p:pic>
+      <p:pic>
+        <p:nvPicPr>
+          <p:cNvPr id="7" name="图片 6">
+            <a:extLst>
+              <a:ext uri="{FF2B5EF4-FFF2-40B4-BE49-F238E27FC236}">
+                <a16:creationId xmlns:a16="http://schemas.microsoft.com/office/drawing/2014/main" id="{741804EB-2861-4C3B-B671-4C82B9487AAE}"/>
+              </a:ext>
+            </a:extLst>
+          </p:cNvPr>
+          <p:cNvPicPr>
+            <a:picLocks noChangeAspect="1"/>
+          </p:cNvPicPr>
+          <p:nvPr/>
+        </p:nvPicPr>
+        <p:blipFill>
+          <a:blip r:embed="rId3"/>
+          <a:stretch>
+            <a:fillRect/>
+          </a:stretch>
+        </p:blipFill>
+        <p:spPr>
+          <a:xfrm>
+            <a:off x="4738739" y="2771944"/>
+            <a:ext cx="4723809" cy="2704762"/>
+          </a:xfrm>
+          <a:prstGeom prst="rect">
+            <a:avLst/>
+          </a:prstGeom>
+        </p:spPr>
+      </p:pic>
+    </p:spTree>
+    <p:extLst>
+      <p:ext uri="{BB962C8B-B14F-4D97-AF65-F5344CB8AC3E}">
+        <p14:creationId xmlns:p14="http://schemas.microsoft.com/office/powerpoint/2010/main" val="1375757598"/>
+      </p:ext>
+    </p:extLst>
+  </p:cSld>
+  <p:clrMapOvr>
+    <a:masterClrMapping/>
+  </p:clrMapOvr>
+</p:sld>
+</file>
+
+<file path=ppt/slides/slide7.xml><?xml version="1.0" encoding="utf-8"?>
+<p:sld xmlns:a="http://schemas.openxmlformats.org/drawingml/2006/main" xmlns:r="http://schemas.openxmlformats.org/officeDocument/2006/relationships" xmlns:p="http://schemas.openxmlformats.org/presentationml/2006/main">
+  <p:cSld>
+    <p:spTree>
+      <p:nvGrpSpPr>
+        <p:cNvPr id="1" name=""/>
+        <p:cNvGrpSpPr/>
+        <p:nvPr/>
+      </p:nvGrpSpPr>
+      <p:grpSpPr>
+        <a:xfrm>
+          <a:off x="0" y="0"/>
+          <a:ext cx="0" cy="0"/>
+          <a:chOff x="0" y="0"/>
+          <a:chExt cx="0" cy="0"/>
+        </a:xfrm>
+      </p:grpSpPr>
+      <p:sp>
+        <p:nvSpPr>
+          <p:cNvPr id="4" name="矩形 3">
+            <a:extLst>
+              <a:ext uri="{FF2B5EF4-FFF2-40B4-BE49-F238E27FC236}">
+                <a16:creationId xmlns:a16="http://schemas.microsoft.com/office/drawing/2014/main" id="{EC647500-6D40-4B27-92F1-E0DEAB82EF4F}"/>
+              </a:ext>
+            </a:extLst>
+          </p:cNvPr>
+          <p:cNvSpPr/>
+          <p:nvPr/>
+        </p:nvSpPr>
+        <p:spPr>
+          <a:xfrm>
+            <a:off x="385309" y="491609"/>
+            <a:ext cx="3866123" cy="523220"/>
+          </a:xfrm>
+          <a:prstGeom prst="rect">
+            <a:avLst/>
+          </a:prstGeom>
+        </p:spPr>
+        <p:txBody>
+          <a:bodyPr wrap="none">
+            <a:spAutoFit/>
+          </a:bodyPr>
+          <a:lstStyle/>
+          <a:p>
+            <a:r>
+              <a:rPr lang="en-US" altLang="zh-CN" sz="2800" b="1" dirty="0">
+                <a:latin typeface="Calibri" panose="020F0502020204030204" pitchFamily="34" charset="0"/>
+                <a:cs typeface="Calibri" panose="020F0502020204030204" pitchFamily="34" charset="0"/>
+              </a:rPr>
+              <a:t>Multi-label Classification</a:t>
+            </a:r>
+          </a:p>
+        </p:txBody>
+      </p:sp>
+      <p:pic>
+        <p:nvPicPr>
+          <p:cNvPr id="5" name="图片 4">
+            <a:extLst>
+              <a:ext uri="{FF2B5EF4-FFF2-40B4-BE49-F238E27FC236}">
+                <a16:creationId xmlns:a16="http://schemas.microsoft.com/office/drawing/2014/main" id="{753A7417-4D8F-4155-9A6F-2A11B0393B94}"/>
+              </a:ext>
+            </a:extLst>
+          </p:cNvPr>
+          <p:cNvPicPr>
+            <a:picLocks noChangeAspect="1"/>
+          </p:cNvPicPr>
+          <p:nvPr/>
+        </p:nvPicPr>
+        <p:blipFill>
+          <a:blip r:embed="rId3"/>
+          <a:stretch>
+            <a:fillRect/>
+          </a:stretch>
+        </p:blipFill>
+        <p:spPr>
+          <a:xfrm>
+            <a:off x="3624549" y="1014829"/>
+            <a:ext cx="4580952" cy="2428571"/>
+          </a:xfrm>
+          <a:prstGeom prst="rect">
+            <a:avLst/>
+          </a:prstGeom>
+        </p:spPr>
+      </p:pic>
+      <p:pic>
+        <p:nvPicPr>
+          <p:cNvPr id="6" name="图片 5">
+            <a:extLst>
+              <a:ext uri="{FF2B5EF4-FFF2-40B4-BE49-F238E27FC236}">
+                <a16:creationId xmlns:a16="http://schemas.microsoft.com/office/drawing/2014/main" id="{A5956A0A-4A86-40EA-B46B-A3175A9E4469}"/>
+              </a:ext>
+            </a:extLst>
+          </p:cNvPr>
+          <p:cNvPicPr>
+            <a:picLocks noChangeAspect="1"/>
+          </p:cNvPicPr>
+          <p:nvPr/>
+        </p:nvPicPr>
+        <p:blipFill>
+          <a:blip r:embed="rId4"/>
+          <a:stretch>
+            <a:fillRect/>
+          </a:stretch>
+        </p:blipFill>
+        <p:spPr>
+          <a:xfrm>
+            <a:off x="1024532" y="3757782"/>
+            <a:ext cx="9514286" cy="2714286"/>
+          </a:xfrm>
+          <a:prstGeom prst="rect">
+            <a:avLst/>
+          </a:prstGeom>
+        </p:spPr>
+      </p:pic>
+    </p:spTree>
+    <p:extLst>
+      <p:ext uri="{BB962C8B-B14F-4D97-AF65-F5344CB8AC3E}">
+        <p14:creationId xmlns:p14="http://schemas.microsoft.com/office/powerpoint/2010/main" val="3119627681"/>
+      </p:ext>
+    </p:extLst>
+  </p:cSld>
+  <p:clrMapOvr>
+    <a:masterClrMapping/>
+  </p:clrMapOvr>
+</p:sld>
+</file>
+
+<file path=ppt/slides/slide8.xml><?xml version="1.0" encoding="utf-8"?>
+<p:sld xmlns:a="http://schemas.openxmlformats.org/drawingml/2006/main" xmlns:r="http://schemas.openxmlformats.org/officeDocument/2006/relationships" xmlns:p="http://schemas.openxmlformats.org/presentationml/2006/main">
+  <p:cSld>
+    <p:spTree>
+      <p:nvGrpSpPr>
+        <p:cNvPr id="1" name=""/>
+        <p:cNvGrpSpPr/>
+        <p:nvPr/>
+      </p:nvGrpSpPr>
+      <p:grpSpPr>
+        <a:xfrm>
+          <a:off x="0" y="0"/>
+          <a:ext cx="0" cy="0"/>
+          <a:chOff x="0" y="0"/>
+          <a:chExt cx="0" cy="0"/>
+        </a:xfrm>
+      </p:grpSpPr>
+      <p:sp>
+        <p:nvSpPr>
+          <p:cNvPr id="6" name="矩形 5">
+            <a:extLst>
+              <a:ext uri="{FF2B5EF4-FFF2-40B4-BE49-F238E27FC236}">
+                <a16:creationId xmlns:a16="http://schemas.microsoft.com/office/drawing/2014/main" id="{F5EBEBE7-FFD6-47C3-AFA6-7A0343D93122}"/>
+              </a:ext>
+            </a:extLst>
+          </p:cNvPr>
+          <p:cNvSpPr/>
+          <p:nvPr/>
+        </p:nvSpPr>
+        <p:spPr>
+          <a:xfrm>
+            <a:off x="412108" y="150168"/>
+            <a:ext cx="2687146" cy="584775"/>
+          </a:xfrm>
+          <a:prstGeom prst="rect">
+            <a:avLst/>
+          </a:prstGeom>
+        </p:spPr>
+        <p:txBody>
+          <a:bodyPr wrap="none">
+            <a:spAutoFit/>
+          </a:bodyPr>
+          <a:lstStyle/>
+          <a:p>
+            <a:pPr lvl="0"/>
+            <a:r>
+              <a:rPr lang="en-US" altLang="zh-CN" sz="3200" b="1" dirty="0">
+                <a:solidFill>
+                  <a:prstClr val="black"/>
+                </a:solidFill>
+                <a:latin typeface="Calibri" panose="020F0502020204030204" pitchFamily="34" charset="0"/>
+                <a:cs typeface="Calibri" panose="020F0502020204030204" pitchFamily="34" charset="0"/>
+              </a:rPr>
+              <a:t>Link</a:t>
+            </a:r>
+            <a:r>
+              <a:rPr lang="en-US" altLang="zh-CN" sz="2400" b="1" dirty="0">
+                <a:solidFill>
+                  <a:prstClr val="black"/>
+                </a:solidFill>
+                <a:latin typeface="Calibri" panose="020F0502020204030204" pitchFamily="34" charset="0"/>
+                <a:cs typeface="Calibri" panose="020F0502020204030204" pitchFamily="34" charset="0"/>
+              </a:rPr>
+              <a:t> </a:t>
+            </a:r>
+            <a:r>
+              <a:rPr lang="en-US" altLang="zh-CN" sz="3200" b="1" dirty="0">
+                <a:solidFill>
+                  <a:prstClr val="black"/>
+                </a:solidFill>
+                <a:latin typeface="Calibri" panose="020F0502020204030204" pitchFamily="34" charset="0"/>
+                <a:cs typeface="Calibri" panose="020F0502020204030204" pitchFamily="34" charset="0"/>
+              </a:rPr>
+              <a:t>Prediction</a:t>
+            </a:r>
+            <a:endParaRPr lang="en-US" altLang="zh-CN" sz="2400" b="1" dirty="0">
+              <a:solidFill>
+                <a:prstClr val="black"/>
+              </a:solidFill>
+              <a:latin typeface="Calibri" panose="020F0502020204030204" pitchFamily="34" charset="0"/>
+              <a:cs typeface="Calibri" panose="020F0502020204030204" pitchFamily="34" charset="0"/>
+            </a:endParaRPr>
+          </a:p>
+        </p:txBody>
+      </p:sp>
+      <p:pic>
+        <p:nvPicPr>
+          <p:cNvPr id="7" name="图片 6">
+            <a:extLst>
+              <a:ext uri="{FF2B5EF4-FFF2-40B4-BE49-F238E27FC236}">
+                <a16:creationId xmlns:a16="http://schemas.microsoft.com/office/drawing/2014/main" id="{0D559976-A2CE-49A2-B0D5-F31B04B04C5F}"/>
+              </a:ext>
+            </a:extLst>
+          </p:cNvPr>
+          <p:cNvPicPr>
+            <a:picLocks noChangeAspect="1"/>
+          </p:cNvPicPr>
+          <p:nvPr/>
+        </p:nvPicPr>
+        <p:blipFill>
+          <a:blip r:embed="rId2"/>
+          <a:stretch>
+            <a:fillRect/>
+          </a:stretch>
+        </p:blipFill>
+        <p:spPr>
+          <a:xfrm>
+            <a:off x="1591205" y="1725542"/>
+            <a:ext cx="8476190" cy="1933333"/>
+          </a:xfrm>
+          <a:prstGeom prst="rect">
+            <a:avLst/>
+          </a:prstGeom>
+        </p:spPr>
+      </p:pic>
+      <mc:AlternateContent xmlns:mc="http://schemas.openxmlformats.org/markup-compatibility/2006">
+        <mc:Choice xmlns:a14="http://schemas.microsoft.com/office/drawing/2010/main" Requires="a14">
+          <p:sp>
+            <p:nvSpPr>
+              <p:cNvPr id="8" name="矩形 7">
+                <a:extLst>
+                  <a:ext uri="{FF2B5EF4-FFF2-40B4-BE49-F238E27FC236}">
+                    <a16:creationId xmlns:a16="http://schemas.microsoft.com/office/drawing/2014/main" id="{BE5E538C-3A40-4B93-B0E4-4A0DBBD2395C}"/>
+                  </a:ext>
+                </a:extLst>
+              </p:cNvPr>
+              <p:cNvSpPr/>
+              <p:nvPr/>
+            </p:nvSpPr>
+            <p:spPr>
+              <a:xfrm>
+                <a:off x="1086858" y="907077"/>
+                <a:ext cx="6704592" cy="646331"/>
+              </a:xfrm>
+              <a:prstGeom prst="rect">
+                <a:avLst/>
+              </a:prstGeom>
+            </p:spPr>
+            <p:txBody>
+              <a:bodyPr wrap="square">
+                <a:spAutoFit/>
+              </a:bodyPr>
+              <a:lstStyle/>
+              <a:p>
+                <a:r>
+                  <a:rPr lang="en-US" altLang="zh-CN" dirty="0">
+                    <a:latin typeface="Calibri" panose="020F0502020204030204" pitchFamily="34" charset="0"/>
+                    <a:cs typeface="Calibri" panose="020F0502020204030204" pitchFamily="34" charset="0"/>
+                  </a:rPr>
+                  <a:t>Randomly hide </a:t>
+                </a:r>
+                <a:r>
+                  <a:rPr lang="en-US" altLang="zh-CN" b="1" dirty="0">
+                    <a:latin typeface="Calibri" panose="020F0502020204030204" pitchFamily="34" charset="0"/>
+                    <a:cs typeface="Calibri" panose="020F0502020204030204" pitchFamily="34" charset="0"/>
+                  </a:rPr>
+                  <a:t>15</a:t>
+                </a:r>
+                <a:r>
+                  <a:rPr lang="en-US" altLang="zh-CN" dirty="0">
+                    <a:latin typeface="Calibri" panose="020F0502020204030204" pitchFamily="34" charset="0"/>
+                    <a:cs typeface="Calibri" panose="020F0502020204030204" pitchFamily="34" charset="0"/>
+                  </a:rPr>
+                  <a:t> percentage of existing links and use the </a:t>
+                </a:r>
+                <a14:m>
+                  <m:oMath xmlns:m="http://schemas.openxmlformats.org/officeDocument/2006/math">
+                    <m:r>
+                      <a:rPr lang="en-US" altLang="zh-CN" i="1" dirty="0" smtClean="0">
+                        <a:latin typeface="Cambria Math" panose="02040503050406030204" pitchFamily="18" charset="0"/>
+                        <a:cs typeface="Calibri" panose="020F0502020204030204" pitchFamily="34" charset="0"/>
+                      </a:rPr>
+                      <m:t>𝑝𝑟𝑒𝑐𝑖𝑠𝑖𝑜𝑛</m:t>
+                    </m:r>
+                    <m:r>
+                      <a:rPr lang="en-US" altLang="zh-CN" i="1" dirty="0" smtClean="0">
+                        <a:latin typeface="Cambria Math" panose="02040503050406030204" pitchFamily="18" charset="0"/>
+                        <a:cs typeface="Calibri" panose="020F0502020204030204" pitchFamily="34" charset="0"/>
+                      </a:rPr>
+                      <m:t>@</m:t>
+                    </m:r>
+                    <m:r>
+                      <a:rPr lang="en-US" altLang="zh-CN" i="1" dirty="0" smtClean="0">
+                        <a:latin typeface="Cambria Math" panose="02040503050406030204" pitchFamily="18" charset="0"/>
+                        <a:cs typeface="Calibri" panose="020F0502020204030204" pitchFamily="34" charset="0"/>
+                      </a:rPr>
+                      <m:t>𝑘</m:t>
+                    </m:r>
+                  </m:oMath>
+                </a14:m>
+                <a:r>
+                  <a:rPr lang="en-US" altLang="zh-CN" dirty="0">
+                    <a:latin typeface="Calibri" panose="020F0502020204030204" pitchFamily="34" charset="0"/>
+                    <a:cs typeface="Calibri" panose="020F0502020204030204" pitchFamily="34" charset="0"/>
+                  </a:rPr>
+                  <a:t> as the evaluation metric of predicting the hidden links.</a:t>
+                </a:r>
+              </a:p>
+            </p:txBody>
+          </p:sp>
+        </mc:Choice>
+        <mc:Fallback>
+          <p:sp>
+            <p:nvSpPr>
+              <p:cNvPr id="8" name="矩形 7">
+                <a:extLst>
+                  <a:ext uri="{FF2B5EF4-FFF2-40B4-BE49-F238E27FC236}">
+                    <a16:creationId xmlns:a16="http://schemas.microsoft.com/office/drawing/2014/main" id="{BE5E538C-3A40-4B93-B0E4-4A0DBBD2395C}"/>
+                  </a:ext>
+                </a:extLst>
+              </p:cNvPr>
+              <p:cNvSpPr>
+                <a:spLocks noRot="1" noChangeAspect="1" noMove="1" noResize="1" noEditPoints="1" noAdjustHandles="1" noChangeArrowheads="1" noChangeShapeType="1" noTextEdit="1"/>
+              </p:cNvSpPr>
+              <p:nvPr/>
+            </p:nvSpPr>
+            <p:spPr>
+              <a:xfrm>
+                <a:off x="1086858" y="907077"/>
+                <a:ext cx="6704592" cy="646331"/>
+              </a:xfrm>
+              <a:prstGeom prst="rect">
+                <a:avLst/>
+              </a:prstGeom>
+              <a:blipFill>
+                <a:blip r:embed="rId3"/>
+                <a:stretch>
+                  <a:fillRect l="-727" t="-5660" b="-14151"/>
+                </a:stretch>
+              </a:blipFill>
+            </p:spPr>
+            <p:txBody>
+              <a:bodyPr/>
+              <a:lstStyle/>
+              <a:p>
+                <a:r>
+                  <a:rPr lang="zh-CN" altLang="en-US">
+                    <a:noFill/>
+                  </a:rPr>
+                  <a:t> </a:t>
+                </a:r>
+              </a:p>
+            </p:txBody>
+          </p:sp>
+        </mc:Fallback>
+      </mc:AlternateContent>
+      <p:pic>
+        <p:nvPicPr>
+          <p:cNvPr id="10" name="图片 9">
+            <a:extLst>
+              <a:ext uri="{FF2B5EF4-FFF2-40B4-BE49-F238E27FC236}">
+                <a16:creationId xmlns:a16="http://schemas.microsoft.com/office/drawing/2014/main" id="{84C8B517-68FB-43EF-ADCC-DFC20E9E8964}"/>
+              </a:ext>
+            </a:extLst>
+          </p:cNvPr>
+          <p:cNvPicPr>
+            <a:picLocks noChangeAspect="1"/>
+          </p:cNvPicPr>
+          <p:nvPr/>
+        </p:nvPicPr>
+        <p:blipFill>
+          <a:blip r:embed="rId4"/>
+          <a:stretch>
+            <a:fillRect/>
+          </a:stretch>
+        </p:blipFill>
+        <p:spPr>
+          <a:xfrm>
+            <a:off x="3715037" y="3831009"/>
+            <a:ext cx="4590476" cy="2876190"/>
+          </a:xfrm>
+          <a:prstGeom prst="rect">
+            <a:avLst/>
+          </a:prstGeom>
+        </p:spPr>
+      </p:pic>
+      <p:sp>
+        <p:nvSpPr>
+          <p:cNvPr id="11" name="矩形 10">
+            <a:extLst>
+              <a:ext uri="{FF2B5EF4-FFF2-40B4-BE49-F238E27FC236}">
+                <a16:creationId xmlns:a16="http://schemas.microsoft.com/office/drawing/2014/main" id="{65F9646A-0D24-4561-8948-BAEF6BDA5EB9}"/>
+              </a:ext>
+            </a:extLst>
+          </p:cNvPr>
+          <p:cNvSpPr/>
+          <p:nvPr/>
+        </p:nvSpPr>
+        <p:spPr>
+          <a:xfrm>
+            <a:off x="1155197" y="1540876"/>
+            <a:ext cx="2150525" cy="369332"/>
+          </a:xfrm>
+          <a:prstGeom prst="rect">
+            <a:avLst/>
+          </a:prstGeom>
+        </p:spPr>
+        <p:txBody>
+          <a:bodyPr wrap="none">
+            <a:spAutoFit/>
+          </a:bodyPr>
+          <a:lstStyle/>
+          <a:p>
+            <a:r>
+              <a:rPr lang="en-US" altLang="zh-CN" b="1" dirty="0">
+                <a:latin typeface="Calibri" panose="020F0502020204030204" pitchFamily="34" charset="0"/>
+                <a:cs typeface="Calibri" panose="020F0502020204030204" pitchFamily="34" charset="0"/>
+              </a:rPr>
+              <a:t>Overall performance</a:t>
+            </a:r>
+          </a:p>
+        </p:txBody>
+      </p:sp>
+      <p:sp>
+        <p:nvSpPr>
+          <p:cNvPr id="12" name="矩形 11">
+            <a:extLst>
+              <a:ext uri="{FF2B5EF4-FFF2-40B4-BE49-F238E27FC236}">
+                <a16:creationId xmlns:a16="http://schemas.microsoft.com/office/drawing/2014/main" id="{2E458492-14D9-4ADE-A501-5CA90143841A}"/>
+              </a:ext>
+            </a:extLst>
+          </p:cNvPr>
+          <p:cNvSpPr/>
+          <p:nvPr/>
+        </p:nvSpPr>
+        <p:spPr>
+          <a:xfrm>
+            <a:off x="1086858" y="3969751"/>
+            <a:ext cx="3033844" cy="369332"/>
+          </a:xfrm>
+          <a:prstGeom prst="rect">
+            <a:avLst/>
+          </a:prstGeom>
+        </p:spPr>
+        <p:txBody>
+          <a:bodyPr wrap="none">
+            <a:spAutoFit/>
+          </a:bodyPr>
+          <a:lstStyle/>
+          <a:p>
+            <a:r>
+              <a:rPr lang="en-US" altLang="zh-CN" b="1" dirty="0">
+                <a:latin typeface="Calibri" panose="020F0502020204030204" pitchFamily="34" charset="0"/>
+                <a:cs typeface="Calibri" panose="020F0502020204030204" pitchFamily="34" charset="0"/>
+              </a:rPr>
+              <a:t>Different sparsity of networks</a:t>
+            </a:r>
+          </a:p>
+        </p:txBody>
+      </p:sp>
+    </p:spTree>
+    <p:extLst>
+      <p:ext uri="{BB962C8B-B14F-4D97-AF65-F5344CB8AC3E}">
+        <p14:creationId xmlns:p14="http://schemas.microsoft.com/office/powerpoint/2010/main" val="1011224800"/>
+      </p:ext>
+    </p:extLst>
+  </p:cSld>
+  <p:clrMapOvr>
+    <a:masterClrMapping/>
+  </p:clrMapOvr>
+</p:sld>
+</file>
+
+<file path=ppt/slides/slide9.xml><?xml version="1.0" encoding="utf-8"?>
+<p:sld xmlns:a="http://schemas.openxmlformats.org/drawingml/2006/main" xmlns:r="http://schemas.openxmlformats.org/officeDocument/2006/relationships" xmlns:p="http://schemas.openxmlformats.org/presentationml/2006/main">
+  <p:cSld>
+    <p:spTree>
+      <p:nvGrpSpPr>
+        <p:cNvPr id="1" name=""/>
+        <p:cNvGrpSpPr/>
+        <p:nvPr/>
+      </p:nvGrpSpPr>
+      <p:grpSpPr>
+        <a:xfrm>
+          <a:off x="0" y="0"/>
+          <a:ext cx="0" cy="0"/>
+          <a:chOff x="0" y="0"/>
+          <a:chExt cx="0" cy="0"/>
+        </a:xfrm>
+      </p:grpSpPr>
+      <p:sp>
+        <p:nvSpPr>
+          <p:cNvPr id="9" name="矩形 8">
+            <a:extLst>
+              <a:ext uri="{FF2B5EF4-FFF2-40B4-BE49-F238E27FC236}">
+                <a16:creationId xmlns:a16="http://schemas.microsoft.com/office/drawing/2014/main" id="{D4AB9EA0-F65F-4A2A-A085-8F4413FD1CDF}"/>
+              </a:ext>
+            </a:extLst>
+          </p:cNvPr>
+          <p:cNvSpPr/>
+          <p:nvPr/>
+        </p:nvSpPr>
+        <p:spPr>
+          <a:xfrm>
+            <a:off x="123825" y="401510"/>
+            <a:ext cx="2355773" cy="584775"/>
+          </a:xfrm>
+          <a:prstGeom prst="rect">
+            <a:avLst/>
+          </a:prstGeom>
+        </p:spPr>
+        <p:txBody>
+          <a:bodyPr wrap="none">
+            <a:spAutoFit/>
+          </a:bodyPr>
+          <a:lstStyle/>
+          <a:p>
+            <a:r>
+              <a:rPr lang="en-US" altLang="zh-CN" sz="3200" b="1" dirty="0">
+                <a:solidFill>
+                  <a:prstClr val="black"/>
+                </a:solidFill>
+                <a:latin typeface="Calibri" panose="020F0502020204030204" pitchFamily="34" charset="0"/>
+                <a:cs typeface="Calibri" panose="020F0502020204030204" pitchFamily="34" charset="0"/>
+              </a:rPr>
+              <a:t>Visualization</a:t>
+            </a:r>
+            <a:endParaRPr lang="zh-CN" altLang="en-US" sz="1600" dirty="0"/>
+          </a:p>
+        </p:txBody>
+      </p:sp>
+      <p:pic>
+        <p:nvPicPr>
+          <p:cNvPr id="10" name="图片 9">
+            <a:extLst>
+              <a:ext uri="{FF2B5EF4-FFF2-40B4-BE49-F238E27FC236}">
+                <a16:creationId xmlns:a16="http://schemas.microsoft.com/office/drawing/2014/main" id="{54589460-27A6-4A9A-9D56-3691B688D55F}"/>
+              </a:ext>
+            </a:extLst>
+          </p:cNvPr>
+          <p:cNvPicPr>
+            <a:picLocks noChangeAspect="1"/>
+          </p:cNvPicPr>
+          <p:nvPr/>
+        </p:nvPicPr>
+        <p:blipFill>
+          <a:blip r:embed="rId2"/>
+          <a:stretch>
+            <a:fillRect/>
+          </a:stretch>
+        </p:blipFill>
+        <p:spPr>
+          <a:xfrm>
+            <a:off x="0" y="1055504"/>
+            <a:ext cx="12192000" cy="3013442"/>
+          </a:xfrm>
+          <a:prstGeom prst="rect">
+            <a:avLst/>
+          </a:prstGeom>
+        </p:spPr>
+      </p:pic>
+      <p:pic>
+        <p:nvPicPr>
+          <p:cNvPr id="11" name="图片 10">
+            <a:extLst>
+              <a:ext uri="{FF2B5EF4-FFF2-40B4-BE49-F238E27FC236}">
+                <a16:creationId xmlns:a16="http://schemas.microsoft.com/office/drawing/2014/main" id="{1219FB44-586F-428C-A1F5-AFC6CA1CFE74}"/>
+              </a:ext>
+            </a:extLst>
+          </p:cNvPr>
+          <p:cNvPicPr>
+            <a:picLocks noChangeAspect="1"/>
+          </p:cNvPicPr>
+          <p:nvPr/>
+        </p:nvPicPr>
+        <p:blipFill>
+          <a:blip r:embed="rId3"/>
+          <a:stretch>
+            <a:fillRect/>
+          </a:stretch>
+        </p:blipFill>
+        <p:spPr>
+          <a:xfrm>
+            <a:off x="2748353" y="4138165"/>
+            <a:ext cx="6257143" cy="1266667"/>
+          </a:xfrm>
+          <a:prstGeom prst="rect">
+            <a:avLst/>
+          </a:prstGeom>
+        </p:spPr>
+      </p:pic>
+    </p:spTree>
+    <p:extLst>
+      <p:ext uri="{BB962C8B-B14F-4D97-AF65-F5344CB8AC3E}">
+        <p14:creationId xmlns:p14="http://schemas.microsoft.com/office/powerpoint/2010/main" val="2393241940"/>
       </p:ext>
     </p:extLst>
   </p:cSld>
@@ -4305,4 +7589,299 @@
     </a:ext>
   </a:extLst>
 </a:theme>
+</file>
+
+<file path=ppt/theme/theme2.xml><?xml version="1.0" encoding="utf-8"?>
+<a:theme xmlns:a="http://schemas.openxmlformats.org/drawingml/2006/main" name="Office 主题​​">
+  <a:themeElements>
+    <a:clrScheme name="Office">
+      <a:dk1>
+        <a:sysClr val="windowText" lastClr="000000"/>
+      </a:dk1>
+      <a:lt1>
+        <a:sysClr val="window" lastClr="FFFFFF"/>
+      </a:lt1>
+      <a:dk2>
+        <a:srgbClr val="44546A"/>
+      </a:dk2>
+      <a:lt2>
+        <a:srgbClr val="E7E6E6"/>
+      </a:lt2>
+      <a:accent1>
+        <a:srgbClr val="4472C4"/>
+      </a:accent1>
+      <a:accent2>
+        <a:srgbClr val="ED7D31"/>
+      </a:accent2>
+      <a:accent3>
+        <a:srgbClr val="A5A5A5"/>
+      </a:accent3>
+      <a:accent4>
+        <a:srgbClr val="FFC000"/>
+      </a:accent4>
+      <a:accent5>
+        <a:srgbClr val="5B9BD5"/>
+      </a:accent5>
+      <a:accent6>
+        <a:srgbClr val="70AD47"/>
+      </a:accent6>
+      <a:hlink>
+        <a:srgbClr val="0563C1"/>
+      </a:hlink>
+      <a:folHlink>
+        <a:srgbClr val="954F72"/>
+      </a:folHlink>
+    </a:clrScheme>
+    <a:fontScheme name="Office">
+      <a:majorFont>
+        <a:latin typeface="等线 Light" panose="020F0302020204030204"/>
+        <a:ea typeface=""/>
+        <a:cs typeface=""/>
+        <a:font script="Jpan" typeface="游ゴシック Light"/>
+        <a:font script="Hang" typeface="맑은 고딕"/>
+        <a:font script="Hans" typeface="等线 Light"/>
+        <a:font script="Hant" typeface="新細明體"/>
+        <a:font script="Arab" typeface="Times New Roman"/>
+        <a:font script="Hebr" typeface="Times New Roman"/>
+        <a:font script="Thai" typeface="Angsana New"/>
+        <a:font script="Ethi" typeface="Nyala"/>
+        <a:font script="Beng" typeface="Vrinda"/>
+        <a:font script="Gujr" typeface="Shruti"/>
+        <a:font script="Khmr" typeface="MoolBoran"/>
+        <a:font script="Knda" typeface="Tunga"/>
+        <a:font script="Guru" typeface="Raavi"/>
+        <a:font script="Cans" typeface="Euphemia"/>
+        <a:font script="Cher" typeface="Plantagenet Cherokee"/>
+        <a:font script="Yiii" typeface="Microsoft Yi Baiti"/>
+        <a:font script="Tibt" typeface="Microsoft Himalaya"/>
+        <a:font script="Thaa" typeface="MV Boli"/>
+        <a:font script="Deva" typeface="Mangal"/>
+        <a:font script="Telu" typeface="Gautami"/>
+        <a:font script="Taml" typeface="Latha"/>
+        <a:font script="Syrc" typeface="Estrangelo Edessa"/>
+        <a:font script="Orya" typeface="Kalinga"/>
+        <a:font script="Mlym" typeface="Kartika"/>
+        <a:font script="Laoo" typeface="DokChampa"/>
+        <a:font script="Sinh" typeface="Iskoola Pota"/>
+        <a:font script="Mong" typeface="Mongolian Baiti"/>
+        <a:font script="Viet" typeface="Times New Roman"/>
+        <a:font script="Uigh" typeface="Microsoft Uighur"/>
+        <a:font script="Geor" typeface="Sylfaen"/>
+        <a:font script="Armn" typeface="Arial"/>
+        <a:font script="Bugi" typeface="Leelawadee UI"/>
+        <a:font script="Bopo" typeface="Microsoft JhengHei"/>
+        <a:font script="Java" typeface="Javanese Text"/>
+        <a:font script="Lisu" typeface="Segoe UI"/>
+        <a:font script="Mymr" typeface="Myanmar Text"/>
+        <a:font script="Nkoo" typeface="Ebrima"/>
+        <a:font script="Olck" typeface="Nirmala UI"/>
+        <a:font script="Osma" typeface="Ebrima"/>
+        <a:font script="Phag" typeface="Phagspa"/>
+        <a:font script="Syrn" typeface="Estrangelo Edessa"/>
+        <a:font script="Syrj" typeface="Estrangelo Edessa"/>
+        <a:font script="Syre" typeface="Estrangelo Edessa"/>
+        <a:font script="Sora" typeface="Nirmala UI"/>
+        <a:font script="Tale" typeface="Microsoft Tai Le"/>
+        <a:font script="Talu" typeface="Microsoft New Tai Lue"/>
+        <a:font script="Tfng" typeface="Ebrima"/>
+      </a:majorFont>
+      <a:minorFont>
+        <a:latin typeface="等线" panose="020F0502020204030204"/>
+        <a:ea typeface=""/>
+        <a:cs typeface=""/>
+        <a:font script="Jpan" typeface="游ゴシック"/>
+        <a:font script="Hang" typeface="맑은 고딕"/>
+        <a:font script="Hans" typeface="等线"/>
+        <a:font script="Hant" typeface="新細明體"/>
+        <a:font script="Arab" typeface="Arial"/>
+        <a:font script="Hebr" typeface="Arial"/>
+        <a:font script="Thai" typeface="Cordia New"/>
+        <a:font script="Ethi" typeface="Nyala"/>
+        <a:font script="Beng" typeface="Vrinda"/>
+        <a:font script="Gujr" typeface="Shruti"/>
+        <a:font script="Khmr" typeface="DaunPenh"/>
+        <a:font script="Knda" typeface="Tunga"/>
+        <a:font script="Guru" typeface="Raavi"/>
+        <a:font script="Cans" typeface="Euphemia"/>
+        <a:font script="Cher" typeface="Plantagenet Cherokee"/>
+        <a:font script="Yiii" typeface="Microsoft Yi Baiti"/>
+        <a:font script="Tibt" typeface="Microsoft Himalaya"/>
+        <a:font script="Thaa" typeface="MV Boli"/>
+        <a:font script="Deva" typeface="Mangal"/>
+        <a:font script="Telu" typeface="Gautami"/>
+        <a:font script="Taml" typeface="Latha"/>
+        <a:font script="Syrc" typeface="Estrangelo Edessa"/>
+        <a:font script="Orya" typeface="Kalinga"/>
+        <a:font script="Mlym" typeface="Kartika"/>
+        <a:font script="Laoo" typeface="DokChampa"/>
+        <a:font script="Sinh" typeface="Iskoola Pota"/>
+        <a:font script="Mong" typeface="Mongolian Baiti"/>
+        <a:font script="Viet" typeface="Arial"/>
+        <a:font script="Uigh" typeface="Microsoft Uighur"/>
+        <a:font script="Geor" typeface="Sylfaen"/>
+        <a:font script="Armn" typeface="Arial"/>
+        <a:font script="Bugi" typeface="Leelawadee UI"/>
+        <a:font script="Bopo" typeface="Microsoft JhengHei"/>
+        <a:font script="Java" typeface="Javanese Text"/>
+        <a:font script="Lisu" typeface="Segoe UI"/>
+        <a:font script="Mymr" typeface="Myanmar Text"/>
+        <a:font script="Nkoo" typeface="Ebrima"/>
+        <a:font script="Olck" typeface="Nirmala UI"/>
+        <a:font script="Osma" typeface="Ebrima"/>
+        <a:font script="Phag" typeface="Phagspa"/>
+        <a:font script="Syrn" typeface="Estrangelo Edessa"/>
+        <a:font script="Syrj" typeface="Estrangelo Edessa"/>
+        <a:font script="Syre" typeface="Estrangelo Edessa"/>
+        <a:font script="Sora" typeface="Nirmala UI"/>
+        <a:font script="Tale" typeface="Microsoft Tai Le"/>
+        <a:font script="Talu" typeface="Microsoft New Tai Lue"/>
+        <a:font script="Tfng" typeface="Ebrima"/>
+      </a:minorFont>
+    </a:fontScheme>
+    <a:fmtScheme name="Office">
+      <a:fillStyleLst>
+        <a:solidFill>
+          <a:schemeClr val="phClr"/>
+        </a:solidFill>
+        <a:gradFill rotWithShape="1">
+          <a:gsLst>
+            <a:gs pos="0">
+              <a:schemeClr val="phClr">
+                <a:lumMod val="110000"/>
+                <a:satMod val="105000"/>
+                <a:tint val="67000"/>
+              </a:schemeClr>
+            </a:gs>
+            <a:gs pos="50000">
+              <a:schemeClr val="phClr">
+                <a:lumMod val="105000"/>
+                <a:satMod val="103000"/>
+                <a:tint val="73000"/>
+              </a:schemeClr>
+            </a:gs>
+            <a:gs pos="100000">
+              <a:schemeClr val="phClr">
+                <a:lumMod val="105000"/>
+                <a:satMod val="109000"/>
+                <a:tint val="81000"/>
+              </a:schemeClr>
+            </a:gs>
+          </a:gsLst>
+          <a:lin ang="5400000" scaled="0"/>
+        </a:gradFill>
+        <a:gradFill rotWithShape="1">
+          <a:gsLst>
+            <a:gs pos="0">
+              <a:schemeClr val="phClr">
+                <a:satMod val="103000"/>
+                <a:lumMod val="102000"/>
+                <a:tint val="94000"/>
+              </a:schemeClr>
+            </a:gs>
+            <a:gs pos="50000">
+              <a:schemeClr val="phClr">
+                <a:satMod val="110000"/>
+                <a:lumMod val="100000"/>
+                <a:shade val="100000"/>
+              </a:schemeClr>
+            </a:gs>
+            <a:gs pos="100000">
+              <a:schemeClr val="phClr">
+                <a:lumMod val="99000"/>
+                <a:satMod val="120000"/>
+                <a:shade val="78000"/>
+              </a:schemeClr>
+            </a:gs>
+          </a:gsLst>
+          <a:lin ang="5400000" scaled="0"/>
+        </a:gradFill>
+      </a:fillStyleLst>
+      <a:lnStyleLst>
+        <a:ln w="6350" cap="flat" cmpd="sng" algn="ctr">
+          <a:solidFill>
+            <a:schemeClr val="phClr"/>
+          </a:solidFill>
+          <a:prstDash val="solid"/>
+          <a:miter lim="800000"/>
+        </a:ln>
+        <a:ln w="12700" cap="flat" cmpd="sng" algn="ctr">
+          <a:solidFill>
+            <a:schemeClr val="phClr"/>
+          </a:solidFill>
+          <a:prstDash val="solid"/>
+          <a:miter lim="800000"/>
+        </a:ln>
+        <a:ln w="19050" cap="flat" cmpd="sng" algn="ctr">
+          <a:solidFill>
+            <a:schemeClr val="phClr"/>
+          </a:solidFill>
+          <a:prstDash val="solid"/>
+          <a:miter lim="800000"/>
+        </a:ln>
+      </a:lnStyleLst>
+      <a:effectStyleLst>
+        <a:effectStyle>
+          <a:effectLst/>
+        </a:effectStyle>
+        <a:effectStyle>
+          <a:effectLst/>
+        </a:effectStyle>
+        <a:effectStyle>
+          <a:effectLst>
+            <a:outerShdw blurRad="57150" dist="19050" dir="5400000" algn="ctr" rotWithShape="0">
+              <a:srgbClr val="000000">
+                <a:alpha val="63000"/>
+              </a:srgbClr>
+            </a:outerShdw>
+          </a:effectLst>
+        </a:effectStyle>
+      </a:effectStyleLst>
+      <a:bgFillStyleLst>
+        <a:solidFill>
+          <a:schemeClr val="phClr"/>
+        </a:solidFill>
+        <a:solidFill>
+          <a:schemeClr val="phClr">
+            <a:tint val="95000"/>
+            <a:satMod val="170000"/>
+          </a:schemeClr>
+        </a:solidFill>
+        <a:gradFill rotWithShape="1">
+          <a:gsLst>
+            <a:gs pos="0">
+              <a:schemeClr val="phClr">
+                <a:tint val="93000"/>
+                <a:satMod val="150000"/>
+                <a:shade val="98000"/>
+                <a:lumMod val="102000"/>
+              </a:schemeClr>
+            </a:gs>
+            <a:gs pos="50000">
+              <a:schemeClr val="phClr">
+                <a:tint val="98000"/>
+                <a:satMod val="130000"/>
+                <a:shade val="90000"/>
+                <a:lumMod val="103000"/>
+              </a:schemeClr>
+            </a:gs>
+            <a:gs pos="100000">
+              <a:schemeClr val="phClr">
+                <a:shade val="63000"/>
+                <a:satMod val="120000"/>
+              </a:schemeClr>
+            </a:gs>
+          </a:gsLst>
+          <a:lin ang="5400000" scaled="0"/>
+        </a:gradFill>
+      </a:bgFillStyleLst>
+    </a:fmtScheme>
+  </a:themeElements>
+  <a:objectDefaults/>
+  <a:extraClrSchemeLst/>
+  <a:extLst>
+    <a:ext uri="{05A4C25C-085E-4340-85A3-A5531E510DB2}">
+      <thm15:themeFamily xmlns:thm15="http://schemas.microsoft.com/office/thememl/2012/main" name="Office Theme" id="{62F939B6-93AF-4DB8-9C6B-D6C7DFDC589F}" vid="{4A3C46E8-61CC-4603-A589-7422A47A8E4A}"/>
+    </a:ext>
+  </a:extLst>
+</a:theme>
 </file>
</xml_diff>